<commit_message>
Update Capstone Diagram for Github
</commit_message>
<xml_diff>
--- a/capstone/Capstone_diagrams.pptx
+++ b/capstone/Capstone_diagrams.pptx
@@ -34,7 +34,7 @@
       </p:grpSpPr>
       <p:sp>
         <p:nvSpPr>
-          <p:cNvPr id="39" name="PlaceHolder 1"/>
+          <p:cNvPr id="36" name="PlaceHolder 1"/>
           <p:cNvSpPr>
             <a:spLocks noGrp="1"/>
           </p:cNvSpPr>
@@ -52,29 +52,26 @@
           </a:prstGeom>
         </p:spPr>
         <p:txBody>
-          <a:bodyPr lIns="0" rIns="0" tIns="0" bIns="0" anchor="ctr"/>
-          <a:p>
+          <a:bodyPr lIns="0" rIns="0" tIns="0" bIns="0" anchor="ctr">
+            <a:noAutofit/>
+          </a:bodyPr>
+          <a:p>
+            <a:pPr algn="ctr"/>
             <a:r>
-              <a:rPr b="0" lang="en-US" sz="1400" spc="-1" strike="noStrike">
-                <a:solidFill>
-                  <a:srgbClr val="000000"/>
-                </a:solidFill>
+              <a:rPr b="0" lang="en-US" sz="4400" spc="-1" strike="noStrike">
                 <a:latin typeface="Arial"/>
               </a:rPr>
               <a:t>Click to move the slide</a:t>
             </a:r>
-            <a:endParaRPr b="0" lang="en-US" sz="1400" spc="-1" strike="noStrike">
-              <a:solidFill>
-                <a:srgbClr val="000000"/>
-              </a:solidFill>
-              <a:latin typeface="Arial"/>
-            </a:endParaRPr>
-          </a:p>
-        </p:txBody>
-      </p:sp>
-      <p:sp>
-        <p:nvSpPr>
-          <p:cNvPr id="40" name="PlaceHolder 2"/>
+            <a:endParaRPr b="0" lang="en-US" sz="4400" spc="-1" strike="noStrike">
+              <a:latin typeface="Arial"/>
+            </a:endParaRPr>
+          </a:p>
+        </p:txBody>
+      </p:sp>
+      <p:sp>
+        <p:nvSpPr>
+          <p:cNvPr id="37" name="PlaceHolder 2"/>
           <p:cNvSpPr>
             <a:spLocks noGrp="1"/>
           </p:cNvSpPr>
@@ -92,7 +89,9 @@
           </a:prstGeom>
         </p:spPr>
         <p:txBody>
-          <a:bodyPr lIns="0" rIns="0" tIns="0" bIns="0"/>
+          <a:bodyPr lIns="0" rIns="0" tIns="0" bIns="0">
+            <a:noAutofit/>
+          </a:bodyPr>
           <a:p>
             <a:r>
               <a:rPr b="0" lang="en-US" sz="2000" spc="-1" strike="noStrike">
@@ -108,7 +107,7 @@
       </p:sp>
       <p:sp>
         <p:nvSpPr>
-          <p:cNvPr id="41" name="PlaceHolder 3"/>
+          <p:cNvPr id="38" name="PlaceHolder 3"/>
           <p:cNvSpPr>
             <a:spLocks noGrp="1"/>
           </p:cNvSpPr>
@@ -126,7 +125,9 @@
           </a:prstGeom>
         </p:spPr>
         <p:txBody>
-          <a:bodyPr lIns="0" rIns="0" tIns="0" bIns="0"/>
+          <a:bodyPr lIns="0" rIns="0" tIns="0" bIns="0">
+            <a:noAutofit/>
+          </a:bodyPr>
           <a:p>
             <a:r>
               <a:rPr b="0" lang="en-US" sz="1400" spc="-1" strike="noStrike">
@@ -142,7 +143,7 @@
       </p:sp>
       <p:sp>
         <p:nvSpPr>
-          <p:cNvPr id="42" name="PlaceHolder 4"/>
+          <p:cNvPr id="39" name="PlaceHolder 4"/>
           <p:cNvSpPr>
             <a:spLocks noGrp="1"/>
           </p:cNvSpPr>
@@ -160,7 +161,9 @@
           </a:prstGeom>
         </p:spPr>
         <p:txBody>
-          <a:bodyPr lIns="0" rIns="0" tIns="0" bIns="0"/>
+          <a:bodyPr lIns="0" rIns="0" tIns="0" bIns="0">
+            <a:noAutofit/>
+          </a:bodyPr>
           <a:p>
             <a:pPr algn="r"/>
             <a:r>
@@ -177,7 +180,7 @@
       </p:sp>
       <p:sp>
         <p:nvSpPr>
-          <p:cNvPr id="43" name="PlaceHolder 5"/>
+          <p:cNvPr id="40" name="PlaceHolder 5"/>
           <p:cNvSpPr>
             <a:spLocks noGrp="1"/>
           </p:cNvSpPr>
@@ -195,7 +198,9 @@
           </a:prstGeom>
         </p:spPr>
         <p:txBody>
-          <a:bodyPr lIns="0" rIns="0" tIns="0" bIns="0" anchor="b"/>
+          <a:bodyPr lIns="0" rIns="0" tIns="0" bIns="0" anchor="b">
+            <a:noAutofit/>
+          </a:bodyPr>
           <a:p>
             <a:r>
               <a:rPr b="0" lang="en-US" sz="1400" spc="-1" strike="noStrike">
@@ -211,7 +216,7 @@
       </p:sp>
       <p:sp>
         <p:nvSpPr>
-          <p:cNvPr id="44" name="PlaceHolder 6"/>
+          <p:cNvPr id="41" name="PlaceHolder 6"/>
           <p:cNvSpPr>
             <a:spLocks noGrp="1"/>
           </p:cNvSpPr>
@@ -229,10 +234,12 @@
           </a:prstGeom>
         </p:spPr>
         <p:txBody>
-          <a:bodyPr lIns="0" rIns="0" tIns="0" bIns="0" anchor="b"/>
+          <a:bodyPr lIns="0" rIns="0" tIns="0" bIns="0" anchor="b">
+            <a:noAutofit/>
+          </a:bodyPr>
           <a:p>
             <a:pPr algn="r"/>
-            <a:fld id="{5A253648-2681-4D7A-A035-A12F44197B01}" type="slidenum">
+            <a:fld id="{81C7705C-6BDA-4E36-A227-8E3F1F3458F9}" type="slidenum">
               <a:rPr b="0" lang="en-US" sz="1400" spc="-1" strike="noStrike">
                 <a:latin typeface="Times New Roman"/>
               </a:rPr>
@@ -269,7 +276,7 @@
       </p:grpSpPr>
       <p:sp>
         <p:nvSpPr>
-          <p:cNvPr id="78" name="PlaceHolder 1"/>
+          <p:cNvPr id="75" name="PlaceHolder 1"/>
           <p:cNvSpPr>
             <a:spLocks noGrp="1"/>
           </p:cNvSpPr>
@@ -280,16 +287,16 @@
         <p:spPr>
           <a:xfrm>
             <a:off x="685800" y="1143000"/>
-            <a:ext cx="5486040" cy="3085920"/>
-          </a:xfrm>
-          <a:prstGeom prst="rect">
-            <a:avLst/>
-          </a:prstGeom>
-        </p:spPr>
-      </p:sp>
-      <p:sp>
-        <p:nvSpPr>
-          <p:cNvPr id="79" name="PlaceHolder 2"/>
+            <a:ext cx="5485680" cy="3085560"/>
+          </a:xfrm>
+          <a:prstGeom prst="rect">
+            <a:avLst/>
+          </a:prstGeom>
+        </p:spPr>
+      </p:sp>
+      <p:sp>
+        <p:nvSpPr>
+          <p:cNvPr id="76" name="PlaceHolder 2"/>
           <p:cNvSpPr>
             <a:spLocks noGrp="1"/>
           </p:cNvSpPr>
@@ -300,14 +307,16 @@
         <p:spPr>
           <a:xfrm>
             <a:off x="685800" y="4400640"/>
-            <a:ext cx="5486040" cy="3600360"/>
-          </a:xfrm>
-          <a:prstGeom prst="rect">
-            <a:avLst/>
-          </a:prstGeom>
-        </p:spPr>
-        <p:txBody>
-          <a:bodyPr/>
+            <a:ext cx="5485680" cy="3600000"/>
+          </a:xfrm>
+          <a:prstGeom prst="rect">
+            <a:avLst/>
+          </a:prstGeom>
+        </p:spPr>
+        <p:txBody>
+          <a:bodyPr lIns="0" rIns="0" tIns="0" bIns="0">
+            <a:noAutofit/>
+          </a:bodyPr>
           <a:p>
             <a:endParaRPr b="0" lang="en-US" sz="2000" spc="-1" strike="noStrike">
               <a:latin typeface="Arial"/>
@@ -317,14 +326,14 @@
       </p:sp>
       <p:sp>
         <p:nvSpPr>
-          <p:cNvPr id="80" name="TextShape 3"/>
-          <p:cNvSpPr txBox="1"/>
+          <p:cNvPr id="77" name="CustomShape 3"/>
+          <p:cNvSpPr/>
           <p:nvPr/>
         </p:nvSpPr>
         <p:spPr>
           <a:xfrm>
             <a:off x="3884760" y="8685360"/>
-            <a:ext cx="2971440" cy="458280"/>
+            <a:ext cx="2971080" cy="457920"/>
           </a:xfrm>
           <a:prstGeom prst="rect">
             <a:avLst/>
@@ -334,22 +343,30 @@
             <a:noFill/>
           </a:ln>
         </p:spPr>
-        <p:txBody>
-          <a:bodyPr anchor="b"/>
+        <p:style>
+          <a:lnRef idx="0"/>
+          <a:fillRef idx="0"/>
+          <a:effectRef idx="0"/>
+          <a:fontRef idx="minor"/>
+        </p:style>
+        <p:txBody>
+          <a:bodyPr lIns="90000" rIns="90000" tIns="45000" bIns="45000" anchor="b">
+            <a:noAutofit/>
+          </a:bodyPr>
           <a:p>
             <a:pPr algn="r">
               <a:lnSpc>
                 <a:spcPct val="100000"/>
               </a:lnSpc>
             </a:pPr>
-            <a:fld id="{637393AB-D4D6-4E77-AFE4-54ECAF9C59E0}" type="slidenum">
+            <a:fld id="{336E34C5-C717-4C82-8E13-3E6C5BA8B88D}" type="slidenum">
               <a:rPr b="0" lang="en-US" sz="1400" spc="-1" strike="noStrike">
                 <a:latin typeface="Times New Roman"/>
               </a:rPr>
               <a:t>&lt;number&gt;</a:t>
             </a:fld>
             <a:endParaRPr b="0" lang="en-US" sz="1400" spc="-1" strike="noStrike">
-              <a:latin typeface="Times New Roman"/>
+              <a:latin typeface="Arial"/>
             </a:endParaRPr>
           </a:p>
         </p:txBody>
@@ -400,7 +417,7 @@
       </p:grpSpPr>
       <p:sp>
         <p:nvSpPr>
-          <p:cNvPr id="24" name="PlaceHolder 1"/>
+          <p:cNvPr id="21" name="PlaceHolder 1"/>
           <p:cNvSpPr>
             <a:spLocks noGrp="1"/>
           </p:cNvSpPr>
@@ -410,28 +427,28 @@
         </p:nvSpPr>
         <p:spPr>
           <a:xfrm>
-            <a:off x="952920" y="324000"/>
-            <a:ext cx="11231640" cy="906840"/>
-          </a:xfrm>
-          <a:prstGeom prst="rect">
-            <a:avLst/>
-          </a:prstGeom>
-        </p:spPr>
-        <p:txBody>
-          <a:bodyPr lIns="0" rIns="0" tIns="0" bIns="0" anchor="ctr"/>
-          <a:p>
-            <a:endParaRPr b="0" lang="en-US" sz="1400" spc="-1" strike="noStrike">
-              <a:solidFill>
-                <a:srgbClr val="000000"/>
-              </a:solidFill>
-              <a:latin typeface="Arial"/>
-            </a:endParaRPr>
-          </a:p>
-        </p:txBody>
-      </p:sp>
-      <p:sp>
-        <p:nvSpPr>
-          <p:cNvPr id="25" name="PlaceHolder 2"/>
+            <a:off x="609480" y="273600"/>
+            <a:ext cx="10972440" cy="1144800"/>
+          </a:xfrm>
+          <a:prstGeom prst="rect">
+            <a:avLst/>
+          </a:prstGeom>
+        </p:spPr>
+        <p:txBody>
+          <a:bodyPr lIns="0" rIns="0" tIns="0" bIns="0" anchor="ctr">
+            <a:noAutofit/>
+          </a:bodyPr>
+          <a:p>
+            <a:pPr algn="ctr"/>
+            <a:endParaRPr b="0" lang="en-US" sz="4400" spc="-1" strike="noStrike">
+              <a:latin typeface="Arial"/>
+            </a:endParaRPr>
+          </a:p>
+        </p:txBody>
+      </p:sp>
+      <p:sp>
+        <p:nvSpPr>
+          <p:cNvPr id="22" name="PlaceHolder 2"/>
           <p:cNvSpPr>
             <a:spLocks noGrp="1"/>
           </p:cNvSpPr>
@@ -441,8 +458,8 @@
         </p:nvSpPr>
         <p:spPr>
           <a:xfrm>
-            <a:off x="828000" y="1528200"/>
-            <a:ext cx="10511640" cy="2232000"/>
+            <a:off x="609480" y="1604520"/>
+            <a:ext cx="10972440" cy="1896840"/>
           </a:xfrm>
           <a:prstGeom prst="rect">
             <a:avLst/>
@@ -453,18 +470,15 @@
             <a:normAutofit/>
           </a:bodyPr>
           <a:p>
-            <a:endParaRPr b="0" lang="en-US" sz="1400" spc="-1" strike="noStrike">
-              <a:solidFill>
-                <a:srgbClr val="000000"/>
-              </a:solidFill>
-              <a:latin typeface="Arial"/>
-            </a:endParaRPr>
-          </a:p>
-        </p:txBody>
-      </p:sp>
-      <p:sp>
-        <p:nvSpPr>
-          <p:cNvPr id="26" name="PlaceHolder 3"/>
+            <a:endParaRPr b="0" lang="en-US" sz="3200" spc="-1" strike="noStrike">
+              <a:latin typeface="Arial"/>
+            </a:endParaRPr>
+          </a:p>
+        </p:txBody>
+      </p:sp>
+      <p:sp>
+        <p:nvSpPr>
+          <p:cNvPr id="23" name="PlaceHolder 3"/>
           <p:cNvSpPr>
             <a:spLocks noGrp="1"/>
           </p:cNvSpPr>
@@ -474,8 +488,8 @@
         </p:nvSpPr>
         <p:spPr>
           <a:xfrm>
-            <a:off x="828000" y="3972600"/>
-            <a:ext cx="10511640" cy="2232000"/>
+            <a:off x="609480" y="3682080"/>
+            <a:ext cx="10972440" cy="1896840"/>
           </a:xfrm>
           <a:prstGeom prst="rect">
             <a:avLst/>
@@ -486,10 +500,7 @@
             <a:normAutofit/>
           </a:bodyPr>
           <a:p>
-            <a:endParaRPr b="0" lang="en-US" sz="1400" spc="-1" strike="noStrike">
-              <a:solidFill>
-                <a:srgbClr val="000000"/>
-              </a:solidFill>
+            <a:endParaRPr b="0" lang="en-US" sz="3200" spc="-1" strike="noStrike">
               <a:latin typeface="Arial"/>
             </a:endParaRPr>
           </a:p>
@@ -519,7 +530,7 @@
       </p:grpSpPr>
       <p:sp>
         <p:nvSpPr>
-          <p:cNvPr id="27" name="PlaceHolder 1"/>
+          <p:cNvPr id="24" name="PlaceHolder 1"/>
           <p:cNvSpPr>
             <a:spLocks noGrp="1"/>
           </p:cNvSpPr>
@@ -529,28 +540,28 @@
         </p:nvSpPr>
         <p:spPr>
           <a:xfrm>
-            <a:off x="952920" y="324000"/>
-            <a:ext cx="11231640" cy="906840"/>
-          </a:xfrm>
-          <a:prstGeom prst="rect">
-            <a:avLst/>
-          </a:prstGeom>
-        </p:spPr>
-        <p:txBody>
-          <a:bodyPr lIns="0" rIns="0" tIns="0" bIns="0" anchor="ctr"/>
-          <a:p>
-            <a:endParaRPr b="0" lang="en-US" sz="1400" spc="-1" strike="noStrike">
-              <a:solidFill>
-                <a:srgbClr val="000000"/>
-              </a:solidFill>
-              <a:latin typeface="Arial"/>
-            </a:endParaRPr>
-          </a:p>
-        </p:txBody>
-      </p:sp>
-      <p:sp>
-        <p:nvSpPr>
-          <p:cNvPr id="28" name="PlaceHolder 2"/>
+            <a:off x="609480" y="273600"/>
+            <a:ext cx="10972440" cy="1144800"/>
+          </a:xfrm>
+          <a:prstGeom prst="rect">
+            <a:avLst/>
+          </a:prstGeom>
+        </p:spPr>
+        <p:txBody>
+          <a:bodyPr lIns="0" rIns="0" tIns="0" bIns="0" anchor="ctr">
+            <a:noAutofit/>
+          </a:bodyPr>
+          <a:p>
+            <a:pPr algn="ctr"/>
+            <a:endParaRPr b="0" lang="en-US" sz="4400" spc="-1" strike="noStrike">
+              <a:latin typeface="Arial"/>
+            </a:endParaRPr>
+          </a:p>
+        </p:txBody>
+      </p:sp>
+      <p:sp>
+        <p:nvSpPr>
+          <p:cNvPr id="25" name="PlaceHolder 2"/>
           <p:cNvSpPr>
             <a:spLocks noGrp="1"/>
           </p:cNvSpPr>
@@ -560,8 +571,8 @@
         </p:nvSpPr>
         <p:spPr>
           <a:xfrm>
-            <a:off x="828000" y="1528200"/>
-            <a:ext cx="5129640" cy="2232000"/>
+            <a:off x="609480" y="1604520"/>
+            <a:ext cx="5354280" cy="1896840"/>
           </a:xfrm>
           <a:prstGeom prst="rect">
             <a:avLst/>
@@ -572,18 +583,15 @@
             <a:normAutofit/>
           </a:bodyPr>
           <a:p>
-            <a:endParaRPr b="0" lang="en-US" sz="1400" spc="-1" strike="noStrike">
-              <a:solidFill>
-                <a:srgbClr val="000000"/>
-              </a:solidFill>
-              <a:latin typeface="Arial"/>
-            </a:endParaRPr>
-          </a:p>
-        </p:txBody>
-      </p:sp>
-      <p:sp>
-        <p:nvSpPr>
-          <p:cNvPr id="29" name="PlaceHolder 3"/>
+            <a:endParaRPr b="0" lang="en-US" sz="3200" spc="-1" strike="noStrike">
+              <a:latin typeface="Arial"/>
+            </a:endParaRPr>
+          </a:p>
+        </p:txBody>
+      </p:sp>
+      <p:sp>
+        <p:nvSpPr>
+          <p:cNvPr id="26" name="PlaceHolder 3"/>
           <p:cNvSpPr>
             <a:spLocks noGrp="1"/>
           </p:cNvSpPr>
@@ -593,8 +601,8 @@
         </p:nvSpPr>
         <p:spPr>
           <a:xfrm>
-            <a:off x="6214680" y="1528200"/>
-            <a:ext cx="5129640" cy="2232000"/>
+            <a:off x="6231960" y="1604520"/>
+            <a:ext cx="5354280" cy="1896840"/>
           </a:xfrm>
           <a:prstGeom prst="rect">
             <a:avLst/>
@@ -605,18 +613,15 @@
             <a:normAutofit/>
           </a:bodyPr>
           <a:p>
-            <a:endParaRPr b="0" lang="en-US" sz="1400" spc="-1" strike="noStrike">
-              <a:solidFill>
-                <a:srgbClr val="000000"/>
-              </a:solidFill>
-              <a:latin typeface="Arial"/>
-            </a:endParaRPr>
-          </a:p>
-        </p:txBody>
-      </p:sp>
-      <p:sp>
-        <p:nvSpPr>
-          <p:cNvPr id="30" name="PlaceHolder 4"/>
+            <a:endParaRPr b="0" lang="en-US" sz="3200" spc="-1" strike="noStrike">
+              <a:latin typeface="Arial"/>
+            </a:endParaRPr>
+          </a:p>
+        </p:txBody>
+      </p:sp>
+      <p:sp>
+        <p:nvSpPr>
+          <p:cNvPr id="27" name="PlaceHolder 4"/>
           <p:cNvSpPr>
             <a:spLocks noGrp="1"/>
           </p:cNvSpPr>
@@ -626,8 +631,8 @@
         </p:nvSpPr>
         <p:spPr>
           <a:xfrm>
-            <a:off x="828000" y="3972600"/>
-            <a:ext cx="5129640" cy="2232000"/>
+            <a:off x="609480" y="3682080"/>
+            <a:ext cx="5354280" cy="1896840"/>
           </a:xfrm>
           <a:prstGeom prst="rect">
             <a:avLst/>
@@ -638,18 +643,15 @@
             <a:normAutofit/>
           </a:bodyPr>
           <a:p>
-            <a:endParaRPr b="0" lang="en-US" sz="1400" spc="-1" strike="noStrike">
-              <a:solidFill>
-                <a:srgbClr val="000000"/>
-              </a:solidFill>
-              <a:latin typeface="Arial"/>
-            </a:endParaRPr>
-          </a:p>
-        </p:txBody>
-      </p:sp>
-      <p:sp>
-        <p:nvSpPr>
-          <p:cNvPr id="31" name="PlaceHolder 5"/>
+            <a:endParaRPr b="0" lang="en-US" sz="3200" spc="-1" strike="noStrike">
+              <a:latin typeface="Arial"/>
+            </a:endParaRPr>
+          </a:p>
+        </p:txBody>
+      </p:sp>
+      <p:sp>
+        <p:nvSpPr>
+          <p:cNvPr id="28" name="PlaceHolder 5"/>
           <p:cNvSpPr>
             <a:spLocks noGrp="1"/>
           </p:cNvSpPr>
@@ -659,8 +661,8 @@
         </p:nvSpPr>
         <p:spPr>
           <a:xfrm>
-            <a:off x="6214680" y="3972600"/>
-            <a:ext cx="5129640" cy="2232000"/>
+            <a:off x="6231960" y="3682080"/>
+            <a:ext cx="5354280" cy="1896840"/>
           </a:xfrm>
           <a:prstGeom prst="rect">
             <a:avLst/>
@@ -671,10 +673,7 @@
             <a:normAutofit/>
           </a:bodyPr>
           <a:p>
-            <a:endParaRPr b="0" lang="en-US" sz="1400" spc="-1" strike="noStrike">
-              <a:solidFill>
-                <a:srgbClr val="000000"/>
-              </a:solidFill>
+            <a:endParaRPr b="0" lang="en-US" sz="3200" spc="-1" strike="noStrike">
               <a:latin typeface="Arial"/>
             </a:endParaRPr>
           </a:p>
@@ -704,7 +703,7 @@
       </p:grpSpPr>
       <p:sp>
         <p:nvSpPr>
-          <p:cNvPr id="32" name="PlaceHolder 1"/>
+          <p:cNvPr id="29" name="PlaceHolder 1"/>
           <p:cNvSpPr>
             <a:spLocks noGrp="1"/>
           </p:cNvSpPr>
@@ -714,28 +713,28 @@
         </p:nvSpPr>
         <p:spPr>
           <a:xfrm>
-            <a:off x="952920" y="324000"/>
-            <a:ext cx="11231640" cy="906840"/>
-          </a:xfrm>
-          <a:prstGeom prst="rect">
-            <a:avLst/>
-          </a:prstGeom>
-        </p:spPr>
-        <p:txBody>
-          <a:bodyPr lIns="0" rIns="0" tIns="0" bIns="0" anchor="ctr"/>
-          <a:p>
-            <a:endParaRPr b="0" lang="en-US" sz="1400" spc="-1" strike="noStrike">
-              <a:solidFill>
-                <a:srgbClr val="000000"/>
-              </a:solidFill>
-              <a:latin typeface="Arial"/>
-            </a:endParaRPr>
-          </a:p>
-        </p:txBody>
-      </p:sp>
-      <p:sp>
-        <p:nvSpPr>
-          <p:cNvPr id="33" name="PlaceHolder 2"/>
+            <a:off x="609480" y="273600"/>
+            <a:ext cx="10972440" cy="1144800"/>
+          </a:xfrm>
+          <a:prstGeom prst="rect">
+            <a:avLst/>
+          </a:prstGeom>
+        </p:spPr>
+        <p:txBody>
+          <a:bodyPr lIns="0" rIns="0" tIns="0" bIns="0" anchor="ctr">
+            <a:noAutofit/>
+          </a:bodyPr>
+          <a:p>
+            <a:pPr algn="ctr"/>
+            <a:endParaRPr b="0" lang="en-US" sz="4400" spc="-1" strike="noStrike">
+              <a:latin typeface="Arial"/>
+            </a:endParaRPr>
+          </a:p>
+        </p:txBody>
+      </p:sp>
+      <p:sp>
+        <p:nvSpPr>
+          <p:cNvPr id="30" name="PlaceHolder 2"/>
           <p:cNvSpPr>
             <a:spLocks noGrp="1"/>
           </p:cNvSpPr>
@@ -745,8 +744,8 @@
         </p:nvSpPr>
         <p:spPr>
           <a:xfrm>
-            <a:off x="828000" y="1528200"/>
-            <a:ext cx="3384360" cy="2232000"/>
+            <a:off x="609480" y="1604520"/>
+            <a:ext cx="3533040" cy="1896840"/>
           </a:xfrm>
           <a:prstGeom prst="rect">
             <a:avLst/>
@@ -757,18 +756,15 @@
             <a:normAutofit/>
           </a:bodyPr>
           <a:p>
-            <a:endParaRPr b="0" lang="en-US" sz="1400" spc="-1" strike="noStrike">
-              <a:solidFill>
-                <a:srgbClr val="000000"/>
-              </a:solidFill>
-              <a:latin typeface="Arial"/>
-            </a:endParaRPr>
-          </a:p>
-        </p:txBody>
-      </p:sp>
-      <p:sp>
-        <p:nvSpPr>
-          <p:cNvPr id="34" name="PlaceHolder 3"/>
+            <a:endParaRPr b="0" lang="en-US" sz="3200" spc="-1" strike="noStrike">
+              <a:latin typeface="Arial"/>
+            </a:endParaRPr>
+          </a:p>
+        </p:txBody>
+      </p:sp>
+      <p:sp>
+        <p:nvSpPr>
+          <p:cNvPr id="31" name="PlaceHolder 3"/>
           <p:cNvSpPr>
             <a:spLocks noGrp="1"/>
           </p:cNvSpPr>
@@ -778,8 +774,8 @@
         </p:nvSpPr>
         <p:spPr>
           <a:xfrm>
-            <a:off x="4381920" y="1528200"/>
-            <a:ext cx="3384360" cy="2232000"/>
+            <a:off x="4319640" y="1604520"/>
+            <a:ext cx="3533040" cy="1896840"/>
           </a:xfrm>
           <a:prstGeom prst="rect">
             <a:avLst/>
@@ -790,18 +786,15 @@
             <a:normAutofit/>
           </a:bodyPr>
           <a:p>
-            <a:endParaRPr b="0" lang="en-US" sz="1400" spc="-1" strike="noStrike">
-              <a:solidFill>
-                <a:srgbClr val="000000"/>
-              </a:solidFill>
-              <a:latin typeface="Arial"/>
-            </a:endParaRPr>
-          </a:p>
-        </p:txBody>
-      </p:sp>
-      <p:sp>
-        <p:nvSpPr>
-          <p:cNvPr id="35" name="PlaceHolder 4"/>
+            <a:endParaRPr b="0" lang="en-US" sz="3200" spc="-1" strike="noStrike">
+              <a:latin typeface="Arial"/>
+            </a:endParaRPr>
+          </a:p>
+        </p:txBody>
+      </p:sp>
+      <p:sp>
+        <p:nvSpPr>
+          <p:cNvPr id="32" name="PlaceHolder 4"/>
           <p:cNvSpPr>
             <a:spLocks noGrp="1"/>
           </p:cNvSpPr>
@@ -811,8 +804,8 @@
         </p:nvSpPr>
         <p:spPr>
           <a:xfrm>
-            <a:off x="7935840" y="1528200"/>
-            <a:ext cx="3384360" cy="2232000"/>
+            <a:off x="8029800" y="1604520"/>
+            <a:ext cx="3533040" cy="1896840"/>
           </a:xfrm>
           <a:prstGeom prst="rect">
             <a:avLst/>
@@ -823,18 +816,15 @@
             <a:normAutofit/>
           </a:bodyPr>
           <a:p>
-            <a:endParaRPr b="0" lang="en-US" sz="1400" spc="-1" strike="noStrike">
-              <a:solidFill>
-                <a:srgbClr val="000000"/>
-              </a:solidFill>
-              <a:latin typeface="Arial"/>
-            </a:endParaRPr>
-          </a:p>
-        </p:txBody>
-      </p:sp>
-      <p:sp>
-        <p:nvSpPr>
-          <p:cNvPr id="36" name="PlaceHolder 5"/>
+            <a:endParaRPr b="0" lang="en-US" sz="3200" spc="-1" strike="noStrike">
+              <a:latin typeface="Arial"/>
+            </a:endParaRPr>
+          </a:p>
+        </p:txBody>
+      </p:sp>
+      <p:sp>
+        <p:nvSpPr>
+          <p:cNvPr id="33" name="PlaceHolder 5"/>
           <p:cNvSpPr>
             <a:spLocks noGrp="1"/>
           </p:cNvSpPr>
@@ -844,8 +834,8 @@
         </p:nvSpPr>
         <p:spPr>
           <a:xfrm>
-            <a:off x="828000" y="3972600"/>
-            <a:ext cx="3384360" cy="2232000"/>
+            <a:off x="609480" y="3682080"/>
+            <a:ext cx="3533040" cy="1896840"/>
           </a:xfrm>
           <a:prstGeom prst="rect">
             <a:avLst/>
@@ -856,18 +846,15 @@
             <a:normAutofit/>
           </a:bodyPr>
           <a:p>
-            <a:endParaRPr b="0" lang="en-US" sz="1400" spc="-1" strike="noStrike">
-              <a:solidFill>
-                <a:srgbClr val="000000"/>
-              </a:solidFill>
-              <a:latin typeface="Arial"/>
-            </a:endParaRPr>
-          </a:p>
-        </p:txBody>
-      </p:sp>
-      <p:sp>
-        <p:nvSpPr>
-          <p:cNvPr id="37" name="PlaceHolder 6"/>
+            <a:endParaRPr b="0" lang="en-US" sz="3200" spc="-1" strike="noStrike">
+              <a:latin typeface="Arial"/>
+            </a:endParaRPr>
+          </a:p>
+        </p:txBody>
+      </p:sp>
+      <p:sp>
+        <p:nvSpPr>
+          <p:cNvPr id="34" name="PlaceHolder 6"/>
           <p:cNvSpPr>
             <a:spLocks noGrp="1"/>
           </p:cNvSpPr>
@@ -877,8 +864,8 @@
         </p:nvSpPr>
         <p:spPr>
           <a:xfrm>
-            <a:off x="4381920" y="3972600"/>
-            <a:ext cx="3384360" cy="2232000"/>
+            <a:off x="4319640" y="3682080"/>
+            <a:ext cx="3533040" cy="1896840"/>
           </a:xfrm>
           <a:prstGeom prst="rect">
             <a:avLst/>
@@ -889,18 +876,15 @@
             <a:normAutofit/>
           </a:bodyPr>
           <a:p>
-            <a:endParaRPr b="0" lang="en-US" sz="1400" spc="-1" strike="noStrike">
-              <a:solidFill>
-                <a:srgbClr val="000000"/>
-              </a:solidFill>
-              <a:latin typeface="Arial"/>
-            </a:endParaRPr>
-          </a:p>
-        </p:txBody>
-      </p:sp>
-      <p:sp>
-        <p:nvSpPr>
-          <p:cNvPr id="38" name="PlaceHolder 7"/>
+            <a:endParaRPr b="0" lang="en-US" sz="3200" spc="-1" strike="noStrike">
+              <a:latin typeface="Arial"/>
+            </a:endParaRPr>
+          </a:p>
+        </p:txBody>
+      </p:sp>
+      <p:sp>
+        <p:nvSpPr>
+          <p:cNvPr id="35" name="PlaceHolder 7"/>
           <p:cNvSpPr>
             <a:spLocks noGrp="1"/>
           </p:cNvSpPr>
@@ -910,8 +894,8 @@
         </p:nvSpPr>
         <p:spPr>
           <a:xfrm>
-            <a:off x="7935840" y="3972600"/>
-            <a:ext cx="3384360" cy="2232000"/>
+            <a:off x="8029800" y="3682080"/>
+            <a:ext cx="3533040" cy="1896840"/>
           </a:xfrm>
           <a:prstGeom prst="rect">
             <a:avLst/>
@@ -922,10 +906,7 @@
             <a:normAutofit/>
           </a:bodyPr>
           <a:p>
-            <a:endParaRPr b="0" lang="en-US" sz="1400" spc="-1" strike="noStrike">
-              <a:solidFill>
-                <a:srgbClr val="000000"/>
-              </a:solidFill>
+            <a:endParaRPr b="0" lang="en-US" sz="3200" spc="-1" strike="noStrike">
               <a:latin typeface="Arial"/>
             </a:endParaRPr>
           </a:p>
@@ -955,7 +936,7 @@
       </p:grpSpPr>
       <p:sp>
         <p:nvSpPr>
-          <p:cNvPr id="3" name="PlaceHolder 1"/>
+          <p:cNvPr id="0" name="PlaceHolder 1"/>
           <p:cNvSpPr>
             <a:spLocks noGrp="1"/>
           </p:cNvSpPr>
@@ -965,28 +946,28 @@
         </p:nvSpPr>
         <p:spPr>
           <a:xfrm>
-            <a:off x="952920" y="324000"/>
-            <a:ext cx="11231640" cy="906840"/>
-          </a:xfrm>
-          <a:prstGeom prst="rect">
-            <a:avLst/>
-          </a:prstGeom>
-        </p:spPr>
-        <p:txBody>
-          <a:bodyPr lIns="0" rIns="0" tIns="0" bIns="0" anchor="ctr"/>
-          <a:p>
-            <a:endParaRPr b="0" lang="en-US" sz="1400" spc="-1" strike="noStrike">
-              <a:solidFill>
-                <a:srgbClr val="000000"/>
-              </a:solidFill>
-              <a:latin typeface="Arial"/>
-            </a:endParaRPr>
-          </a:p>
-        </p:txBody>
-      </p:sp>
-      <p:sp>
-        <p:nvSpPr>
-          <p:cNvPr id="4" name="PlaceHolder 2"/>
+            <a:off x="609480" y="273600"/>
+            <a:ext cx="10972440" cy="1144800"/>
+          </a:xfrm>
+          <a:prstGeom prst="rect">
+            <a:avLst/>
+          </a:prstGeom>
+        </p:spPr>
+        <p:txBody>
+          <a:bodyPr lIns="0" rIns="0" tIns="0" bIns="0" anchor="ctr">
+            <a:noAutofit/>
+          </a:bodyPr>
+          <a:p>
+            <a:pPr algn="ctr"/>
+            <a:endParaRPr b="0" lang="en-US" sz="4400" spc="-1" strike="noStrike">
+              <a:latin typeface="Arial"/>
+            </a:endParaRPr>
+          </a:p>
+        </p:txBody>
+      </p:sp>
+      <p:sp>
+        <p:nvSpPr>
+          <p:cNvPr id="1" name="PlaceHolder 2"/>
           <p:cNvSpPr>
             <a:spLocks noGrp="1"/>
           </p:cNvSpPr>
@@ -996,15 +977,17 @@
         </p:nvSpPr>
         <p:spPr>
           <a:xfrm>
-            <a:off x="828000" y="1528200"/>
-            <a:ext cx="10511640" cy="4679640"/>
-          </a:xfrm>
-          <a:prstGeom prst="rect">
-            <a:avLst/>
-          </a:prstGeom>
-        </p:spPr>
-        <p:txBody>
-          <a:bodyPr lIns="0" rIns="0" tIns="0" bIns="0" anchor="ctr"/>
+            <a:off x="609480" y="1604520"/>
+            <a:ext cx="10972440" cy="3977280"/>
+          </a:xfrm>
+          <a:prstGeom prst="rect">
+            <a:avLst/>
+          </a:prstGeom>
+        </p:spPr>
+        <p:txBody>
+          <a:bodyPr lIns="0" rIns="0" tIns="0" bIns="0" anchor="ctr">
+            <a:noAutofit/>
+          </a:bodyPr>
           <a:p>
             <a:pPr algn="ctr"/>
             <a:endParaRPr b="0" lang="en-US" sz="3200" spc="-1" strike="noStrike">
@@ -1037,7 +1020,7 @@
       </p:grpSpPr>
       <p:sp>
         <p:nvSpPr>
-          <p:cNvPr id="5" name="PlaceHolder 1"/>
+          <p:cNvPr id="2" name="PlaceHolder 1"/>
           <p:cNvSpPr>
             <a:spLocks noGrp="1"/>
           </p:cNvSpPr>
@@ -1047,28 +1030,28 @@
         </p:nvSpPr>
         <p:spPr>
           <a:xfrm>
-            <a:off x="952920" y="324000"/>
-            <a:ext cx="11231640" cy="906840"/>
-          </a:xfrm>
-          <a:prstGeom prst="rect">
-            <a:avLst/>
-          </a:prstGeom>
-        </p:spPr>
-        <p:txBody>
-          <a:bodyPr lIns="0" rIns="0" tIns="0" bIns="0" anchor="ctr"/>
-          <a:p>
-            <a:endParaRPr b="0" lang="en-US" sz="1400" spc="-1" strike="noStrike">
-              <a:solidFill>
-                <a:srgbClr val="000000"/>
-              </a:solidFill>
-              <a:latin typeface="Arial"/>
-            </a:endParaRPr>
-          </a:p>
-        </p:txBody>
-      </p:sp>
-      <p:sp>
-        <p:nvSpPr>
-          <p:cNvPr id="6" name="PlaceHolder 2"/>
+            <a:off x="609480" y="273600"/>
+            <a:ext cx="10972440" cy="1144800"/>
+          </a:xfrm>
+          <a:prstGeom prst="rect">
+            <a:avLst/>
+          </a:prstGeom>
+        </p:spPr>
+        <p:txBody>
+          <a:bodyPr lIns="0" rIns="0" tIns="0" bIns="0" anchor="ctr">
+            <a:noAutofit/>
+          </a:bodyPr>
+          <a:p>
+            <a:pPr algn="ctr"/>
+            <a:endParaRPr b="0" lang="en-US" sz="4400" spc="-1" strike="noStrike">
+              <a:latin typeface="Arial"/>
+            </a:endParaRPr>
+          </a:p>
+        </p:txBody>
+      </p:sp>
+      <p:sp>
+        <p:nvSpPr>
+          <p:cNvPr id="3" name="PlaceHolder 2"/>
           <p:cNvSpPr>
             <a:spLocks noGrp="1"/>
           </p:cNvSpPr>
@@ -1078,8 +1061,8 @@
         </p:nvSpPr>
         <p:spPr>
           <a:xfrm>
-            <a:off x="828000" y="1528200"/>
-            <a:ext cx="10511640" cy="4679640"/>
+            <a:off x="609480" y="1604520"/>
+            <a:ext cx="10972440" cy="3977280"/>
           </a:xfrm>
           <a:prstGeom prst="rect">
             <a:avLst/>
@@ -1090,10 +1073,7 @@
             <a:normAutofit/>
           </a:bodyPr>
           <a:p>
-            <a:endParaRPr b="0" lang="en-US" sz="1400" spc="-1" strike="noStrike">
-              <a:solidFill>
-                <a:srgbClr val="000000"/>
-              </a:solidFill>
+            <a:endParaRPr b="0" lang="en-US" sz="3200" spc="-1" strike="noStrike">
               <a:latin typeface="Arial"/>
             </a:endParaRPr>
           </a:p>
@@ -1123,7 +1103,7 @@
       </p:grpSpPr>
       <p:sp>
         <p:nvSpPr>
-          <p:cNvPr id="7" name="PlaceHolder 1"/>
+          <p:cNvPr id="4" name="PlaceHolder 1"/>
           <p:cNvSpPr>
             <a:spLocks noGrp="1"/>
           </p:cNvSpPr>
@@ -1133,28 +1113,28 @@
         </p:nvSpPr>
         <p:spPr>
           <a:xfrm>
-            <a:off x="952920" y="324000"/>
-            <a:ext cx="11231640" cy="906840"/>
-          </a:xfrm>
-          <a:prstGeom prst="rect">
-            <a:avLst/>
-          </a:prstGeom>
-        </p:spPr>
-        <p:txBody>
-          <a:bodyPr lIns="0" rIns="0" tIns="0" bIns="0" anchor="ctr"/>
-          <a:p>
-            <a:endParaRPr b="0" lang="en-US" sz="1400" spc="-1" strike="noStrike">
-              <a:solidFill>
-                <a:srgbClr val="000000"/>
-              </a:solidFill>
-              <a:latin typeface="Arial"/>
-            </a:endParaRPr>
-          </a:p>
-        </p:txBody>
-      </p:sp>
-      <p:sp>
-        <p:nvSpPr>
-          <p:cNvPr id="8" name="PlaceHolder 2"/>
+            <a:off x="609480" y="273600"/>
+            <a:ext cx="10972440" cy="1144800"/>
+          </a:xfrm>
+          <a:prstGeom prst="rect">
+            <a:avLst/>
+          </a:prstGeom>
+        </p:spPr>
+        <p:txBody>
+          <a:bodyPr lIns="0" rIns="0" tIns="0" bIns="0" anchor="ctr">
+            <a:noAutofit/>
+          </a:bodyPr>
+          <a:p>
+            <a:pPr algn="ctr"/>
+            <a:endParaRPr b="0" lang="en-US" sz="4400" spc="-1" strike="noStrike">
+              <a:latin typeface="Arial"/>
+            </a:endParaRPr>
+          </a:p>
+        </p:txBody>
+      </p:sp>
+      <p:sp>
+        <p:nvSpPr>
+          <p:cNvPr id="5" name="PlaceHolder 2"/>
           <p:cNvSpPr>
             <a:spLocks noGrp="1"/>
           </p:cNvSpPr>
@@ -1164,8 +1144,8 @@
         </p:nvSpPr>
         <p:spPr>
           <a:xfrm>
-            <a:off x="828000" y="1528200"/>
-            <a:ext cx="5129640" cy="4679640"/>
+            <a:off x="609480" y="1604520"/>
+            <a:ext cx="5354280" cy="3977280"/>
           </a:xfrm>
           <a:prstGeom prst="rect">
             <a:avLst/>
@@ -1176,18 +1156,15 @@
             <a:normAutofit/>
           </a:bodyPr>
           <a:p>
-            <a:endParaRPr b="0" lang="en-US" sz="1400" spc="-1" strike="noStrike">
-              <a:solidFill>
-                <a:srgbClr val="000000"/>
-              </a:solidFill>
-              <a:latin typeface="Arial"/>
-            </a:endParaRPr>
-          </a:p>
-        </p:txBody>
-      </p:sp>
-      <p:sp>
-        <p:nvSpPr>
-          <p:cNvPr id="9" name="PlaceHolder 3"/>
+            <a:endParaRPr b="0" lang="en-US" sz="3200" spc="-1" strike="noStrike">
+              <a:latin typeface="Arial"/>
+            </a:endParaRPr>
+          </a:p>
+        </p:txBody>
+      </p:sp>
+      <p:sp>
+        <p:nvSpPr>
+          <p:cNvPr id="6" name="PlaceHolder 3"/>
           <p:cNvSpPr>
             <a:spLocks noGrp="1"/>
           </p:cNvSpPr>
@@ -1197,8 +1174,8 @@
         </p:nvSpPr>
         <p:spPr>
           <a:xfrm>
-            <a:off x="6214680" y="1528200"/>
-            <a:ext cx="5129640" cy="4679640"/>
+            <a:off x="6231960" y="1604520"/>
+            <a:ext cx="5354280" cy="3977280"/>
           </a:xfrm>
           <a:prstGeom prst="rect">
             <a:avLst/>
@@ -1209,10 +1186,7 @@
             <a:normAutofit/>
           </a:bodyPr>
           <a:p>
-            <a:endParaRPr b="0" lang="en-US" sz="1400" spc="-1" strike="noStrike">
-              <a:solidFill>
-                <a:srgbClr val="000000"/>
-              </a:solidFill>
+            <a:endParaRPr b="0" lang="en-US" sz="3200" spc="-1" strike="noStrike">
               <a:latin typeface="Arial"/>
             </a:endParaRPr>
           </a:p>
@@ -1242,7 +1216,7 @@
       </p:grpSpPr>
       <p:sp>
         <p:nvSpPr>
-          <p:cNvPr id="10" name="PlaceHolder 1"/>
+          <p:cNvPr id="7" name="PlaceHolder 1"/>
           <p:cNvSpPr>
             <a:spLocks noGrp="1"/>
           </p:cNvSpPr>
@@ -1252,20 +1226,20 @@
         </p:nvSpPr>
         <p:spPr>
           <a:xfrm>
-            <a:off x="952920" y="324000"/>
-            <a:ext cx="11231640" cy="906840"/>
-          </a:xfrm>
-          <a:prstGeom prst="rect">
-            <a:avLst/>
-          </a:prstGeom>
-        </p:spPr>
-        <p:txBody>
-          <a:bodyPr lIns="0" rIns="0" tIns="0" bIns="0" anchor="ctr"/>
-          <a:p>
-            <a:endParaRPr b="0" lang="en-US" sz="1400" spc="-1" strike="noStrike">
-              <a:solidFill>
-                <a:srgbClr val="000000"/>
-              </a:solidFill>
+            <a:off x="609480" y="273600"/>
+            <a:ext cx="10972440" cy="1144800"/>
+          </a:xfrm>
+          <a:prstGeom prst="rect">
+            <a:avLst/>
+          </a:prstGeom>
+        </p:spPr>
+        <p:txBody>
+          <a:bodyPr lIns="0" rIns="0" tIns="0" bIns="0" anchor="ctr">
+            <a:noAutofit/>
+          </a:bodyPr>
+          <a:p>
+            <a:pPr algn="ctr"/>
+            <a:endParaRPr b="0" lang="en-US" sz="4400" spc="-1" strike="noStrike">
               <a:latin typeface="Arial"/>
             </a:endParaRPr>
           </a:p>
@@ -1295,7 +1269,7 @@
       </p:grpSpPr>
       <p:sp>
         <p:nvSpPr>
-          <p:cNvPr id="11" name="PlaceHolder 1"/>
+          <p:cNvPr id="8" name="PlaceHolder 1"/>
           <p:cNvSpPr>
             <a:spLocks noGrp="1"/>
           </p:cNvSpPr>
@@ -1305,15 +1279,17 @@
         </p:nvSpPr>
         <p:spPr>
           <a:xfrm>
-            <a:off x="952920" y="324000"/>
-            <a:ext cx="11231640" cy="4204800"/>
-          </a:xfrm>
-          <a:prstGeom prst="rect">
-            <a:avLst/>
-          </a:prstGeom>
-        </p:spPr>
-        <p:txBody>
-          <a:bodyPr lIns="0" rIns="0" tIns="0" bIns="0" anchor="ctr"/>
+            <a:off x="609480" y="273600"/>
+            <a:ext cx="10972440" cy="5307840"/>
+          </a:xfrm>
+          <a:prstGeom prst="rect">
+            <a:avLst/>
+          </a:prstGeom>
+        </p:spPr>
+        <p:txBody>
+          <a:bodyPr lIns="0" rIns="0" tIns="0" bIns="0" anchor="ctr">
+            <a:noAutofit/>
+          </a:bodyPr>
           <a:p>
             <a:pPr algn="ctr"/>
             <a:endParaRPr b="0" lang="en-US" sz="3200" spc="-1" strike="noStrike">
@@ -1346,7 +1322,7 @@
       </p:grpSpPr>
       <p:sp>
         <p:nvSpPr>
-          <p:cNvPr id="12" name="PlaceHolder 1"/>
+          <p:cNvPr id="9" name="PlaceHolder 1"/>
           <p:cNvSpPr>
             <a:spLocks noGrp="1"/>
           </p:cNvSpPr>
@@ -1356,28 +1332,28 @@
         </p:nvSpPr>
         <p:spPr>
           <a:xfrm>
-            <a:off x="952920" y="324000"/>
-            <a:ext cx="11231640" cy="906840"/>
-          </a:xfrm>
-          <a:prstGeom prst="rect">
-            <a:avLst/>
-          </a:prstGeom>
-        </p:spPr>
-        <p:txBody>
-          <a:bodyPr lIns="0" rIns="0" tIns="0" bIns="0" anchor="ctr"/>
-          <a:p>
-            <a:endParaRPr b="0" lang="en-US" sz="1400" spc="-1" strike="noStrike">
-              <a:solidFill>
-                <a:srgbClr val="000000"/>
-              </a:solidFill>
-              <a:latin typeface="Arial"/>
-            </a:endParaRPr>
-          </a:p>
-        </p:txBody>
-      </p:sp>
-      <p:sp>
-        <p:nvSpPr>
-          <p:cNvPr id="13" name="PlaceHolder 2"/>
+            <a:off x="609480" y="273600"/>
+            <a:ext cx="10972440" cy="1144800"/>
+          </a:xfrm>
+          <a:prstGeom prst="rect">
+            <a:avLst/>
+          </a:prstGeom>
+        </p:spPr>
+        <p:txBody>
+          <a:bodyPr lIns="0" rIns="0" tIns="0" bIns="0" anchor="ctr">
+            <a:noAutofit/>
+          </a:bodyPr>
+          <a:p>
+            <a:pPr algn="ctr"/>
+            <a:endParaRPr b="0" lang="en-US" sz="4400" spc="-1" strike="noStrike">
+              <a:latin typeface="Arial"/>
+            </a:endParaRPr>
+          </a:p>
+        </p:txBody>
+      </p:sp>
+      <p:sp>
+        <p:nvSpPr>
+          <p:cNvPr id="10" name="PlaceHolder 2"/>
           <p:cNvSpPr>
             <a:spLocks noGrp="1"/>
           </p:cNvSpPr>
@@ -1387,8 +1363,8 @@
         </p:nvSpPr>
         <p:spPr>
           <a:xfrm>
-            <a:off x="828000" y="1528200"/>
-            <a:ext cx="5129640" cy="2232000"/>
+            <a:off x="609480" y="1604520"/>
+            <a:ext cx="5354280" cy="1896840"/>
           </a:xfrm>
           <a:prstGeom prst="rect">
             <a:avLst/>
@@ -1399,18 +1375,15 @@
             <a:normAutofit/>
           </a:bodyPr>
           <a:p>
-            <a:endParaRPr b="0" lang="en-US" sz="1400" spc="-1" strike="noStrike">
-              <a:solidFill>
-                <a:srgbClr val="000000"/>
-              </a:solidFill>
-              <a:latin typeface="Arial"/>
-            </a:endParaRPr>
-          </a:p>
-        </p:txBody>
-      </p:sp>
-      <p:sp>
-        <p:nvSpPr>
-          <p:cNvPr id="14" name="PlaceHolder 3"/>
+            <a:endParaRPr b="0" lang="en-US" sz="3200" spc="-1" strike="noStrike">
+              <a:latin typeface="Arial"/>
+            </a:endParaRPr>
+          </a:p>
+        </p:txBody>
+      </p:sp>
+      <p:sp>
+        <p:nvSpPr>
+          <p:cNvPr id="11" name="PlaceHolder 3"/>
           <p:cNvSpPr>
             <a:spLocks noGrp="1"/>
           </p:cNvSpPr>
@@ -1420,8 +1393,8 @@
         </p:nvSpPr>
         <p:spPr>
           <a:xfrm>
-            <a:off x="6214680" y="1528200"/>
-            <a:ext cx="5129640" cy="4679640"/>
+            <a:off x="6231960" y="1604520"/>
+            <a:ext cx="5354280" cy="3977280"/>
           </a:xfrm>
           <a:prstGeom prst="rect">
             <a:avLst/>
@@ -1432,18 +1405,15 @@
             <a:normAutofit/>
           </a:bodyPr>
           <a:p>
-            <a:endParaRPr b="0" lang="en-US" sz="1400" spc="-1" strike="noStrike">
-              <a:solidFill>
-                <a:srgbClr val="000000"/>
-              </a:solidFill>
-              <a:latin typeface="Arial"/>
-            </a:endParaRPr>
-          </a:p>
-        </p:txBody>
-      </p:sp>
-      <p:sp>
-        <p:nvSpPr>
-          <p:cNvPr id="15" name="PlaceHolder 4"/>
+            <a:endParaRPr b="0" lang="en-US" sz="3200" spc="-1" strike="noStrike">
+              <a:latin typeface="Arial"/>
+            </a:endParaRPr>
+          </a:p>
+        </p:txBody>
+      </p:sp>
+      <p:sp>
+        <p:nvSpPr>
+          <p:cNvPr id="12" name="PlaceHolder 4"/>
           <p:cNvSpPr>
             <a:spLocks noGrp="1"/>
           </p:cNvSpPr>
@@ -1453,8 +1423,8 @@
         </p:nvSpPr>
         <p:spPr>
           <a:xfrm>
-            <a:off x="828000" y="3972600"/>
-            <a:ext cx="5129640" cy="2232000"/>
+            <a:off x="609480" y="3682080"/>
+            <a:ext cx="5354280" cy="1896840"/>
           </a:xfrm>
           <a:prstGeom prst="rect">
             <a:avLst/>
@@ -1465,10 +1435,7 @@
             <a:normAutofit/>
           </a:bodyPr>
           <a:p>
-            <a:endParaRPr b="0" lang="en-US" sz="1400" spc="-1" strike="noStrike">
-              <a:solidFill>
-                <a:srgbClr val="000000"/>
-              </a:solidFill>
+            <a:endParaRPr b="0" lang="en-US" sz="3200" spc="-1" strike="noStrike">
               <a:latin typeface="Arial"/>
             </a:endParaRPr>
           </a:p>
@@ -1498,7 +1465,7 @@
       </p:grpSpPr>
       <p:sp>
         <p:nvSpPr>
-          <p:cNvPr id="16" name="PlaceHolder 1"/>
+          <p:cNvPr id="13" name="PlaceHolder 1"/>
           <p:cNvSpPr>
             <a:spLocks noGrp="1"/>
           </p:cNvSpPr>
@@ -1508,28 +1475,28 @@
         </p:nvSpPr>
         <p:spPr>
           <a:xfrm>
-            <a:off x="952920" y="324000"/>
-            <a:ext cx="11231640" cy="906840"/>
-          </a:xfrm>
-          <a:prstGeom prst="rect">
-            <a:avLst/>
-          </a:prstGeom>
-        </p:spPr>
-        <p:txBody>
-          <a:bodyPr lIns="0" rIns="0" tIns="0" bIns="0" anchor="ctr"/>
-          <a:p>
-            <a:endParaRPr b="0" lang="en-US" sz="1400" spc="-1" strike="noStrike">
-              <a:solidFill>
-                <a:srgbClr val="000000"/>
-              </a:solidFill>
-              <a:latin typeface="Arial"/>
-            </a:endParaRPr>
-          </a:p>
-        </p:txBody>
-      </p:sp>
-      <p:sp>
-        <p:nvSpPr>
-          <p:cNvPr id="17" name="PlaceHolder 2"/>
+            <a:off x="609480" y="273600"/>
+            <a:ext cx="10972440" cy="1144800"/>
+          </a:xfrm>
+          <a:prstGeom prst="rect">
+            <a:avLst/>
+          </a:prstGeom>
+        </p:spPr>
+        <p:txBody>
+          <a:bodyPr lIns="0" rIns="0" tIns="0" bIns="0" anchor="ctr">
+            <a:noAutofit/>
+          </a:bodyPr>
+          <a:p>
+            <a:pPr algn="ctr"/>
+            <a:endParaRPr b="0" lang="en-US" sz="4400" spc="-1" strike="noStrike">
+              <a:latin typeface="Arial"/>
+            </a:endParaRPr>
+          </a:p>
+        </p:txBody>
+      </p:sp>
+      <p:sp>
+        <p:nvSpPr>
+          <p:cNvPr id="14" name="PlaceHolder 2"/>
           <p:cNvSpPr>
             <a:spLocks noGrp="1"/>
           </p:cNvSpPr>
@@ -1539,8 +1506,8 @@
         </p:nvSpPr>
         <p:spPr>
           <a:xfrm>
-            <a:off x="828000" y="1528200"/>
-            <a:ext cx="5129640" cy="4679640"/>
+            <a:off x="609480" y="1604520"/>
+            <a:ext cx="5354280" cy="3977280"/>
           </a:xfrm>
           <a:prstGeom prst="rect">
             <a:avLst/>
@@ -1551,18 +1518,15 @@
             <a:normAutofit/>
           </a:bodyPr>
           <a:p>
-            <a:endParaRPr b="0" lang="en-US" sz="1400" spc="-1" strike="noStrike">
-              <a:solidFill>
-                <a:srgbClr val="000000"/>
-              </a:solidFill>
-              <a:latin typeface="Arial"/>
-            </a:endParaRPr>
-          </a:p>
-        </p:txBody>
-      </p:sp>
-      <p:sp>
-        <p:nvSpPr>
-          <p:cNvPr id="18" name="PlaceHolder 3"/>
+            <a:endParaRPr b="0" lang="en-US" sz="3200" spc="-1" strike="noStrike">
+              <a:latin typeface="Arial"/>
+            </a:endParaRPr>
+          </a:p>
+        </p:txBody>
+      </p:sp>
+      <p:sp>
+        <p:nvSpPr>
+          <p:cNvPr id="15" name="PlaceHolder 3"/>
           <p:cNvSpPr>
             <a:spLocks noGrp="1"/>
           </p:cNvSpPr>
@@ -1572,8 +1536,8 @@
         </p:nvSpPr>
         <p:spPr>
           <a:xfrm>
-            <a:off x="6214680" y="1528200"/>
-            <a:ext cx="5129640" cy="2232000"/>
+            <a:off x="6231960" y="1604520"/>
+            <a:ext cx="5354280" cy="1896840"/>
           </a:xfrm>
           <a:prstGeom prst="rect">
             <a:avLst/>
@@ -1584,18 +1548,15 @@
             <a:normAutofit/>
           </a:bodyPr>
           <a:p>
-            <a:endParaRPr b="0" lang="en-US" sz="1400" spc="-1" strike="noStrike">
-              <a:solidFill>
-                <a:srgbClr val="000000"/>
-              </a:solidFill>
-              <a:latin typeface="Arial"/>
-            </a:endParaRPr>
-          </a:p>
-        </p:txBody>
-      </p:sp>
-      <p:sp>
-        <p:nvSpPr>
-          <p:cNvPr id="19" name="PlaceHolder 4"/>
+            <a:endParaRPr b="0" lang="en-US" sz="3200" spc="-1" strike="noStrike">
+              <a:latin typeface="Arial"/>
+            </a:endParaRPr>
+          </a:p>
+        </p:txBody>
+      </p:sp>
+      <p:sp>
+        <p:nvSpPr>
+          <p:cNvPr id="16" name="PlaceHolder 4"/>
           <p:cNvSpPr>
             <a:spLocks noGrp="1"/>
           </p:cNvSpPr>
@@ -1605,8 +1566,8 @@
         </p:nvSpPr>
         <p:spPr>
           <a:xfrm>
-            <a:off x="6214680" y="3972600"/>
-            <a:ext cx="5129640" cy="2232000"/>
+            <a:off x="6231960" y="3682080"/>
+            <a:ext cx="5354280" cy="1896840"/>
           </a:xfrm>
           <a:prstGeom prst="rect">
             <a:avLst/>
@@ -1617,10 +1578,7 @@
             <a:normAutofit/>
           </a:bodyPr>
           <a:p>
-            <a:endParaRPr b="0" lang="en-US" sz="1400" spc="-1" strike="noStrike">
-              <a:solidFill>
-                <a:srgbClr val="000000"/>
-              </a:solidFill>
+            <a:endParaRPr b="0" lang="en-US" sz="3200" spc="-1" strike="noStrike">
               <a:latin typeface="Arial"/>
             </a:endParaRPr>
           </a:p>
@@ -1650,7 +1608,7 @@
       </p:grpSpPr>
       <p:sp>
         <p:nvSpPr>
-          <p:cNvPr id="20" name="PlaceHolder 1"/>
+          <p:cNvPr id="17" name="PlaceHolder 1"/>
           <p:cNvSpPr>
             <a:spLocks noGrp="1"/>
           </p:cNvSpPr>
@@ -1660,28 +1618,28 @@
         </p:nvSpPr>
         <p:spPr>
           <a:xfrm>
-            <a:off x="952920" y="324000"/>
-            <a:ext cx="11231640" cy="906840"/>
-          </a:xfrm>
-          <a:prstGeom prst="rect">
-            <a:avLst/>
-          </a:prstGeom>
-        </p:spPr>
-        <p:txBody>
-          <a:bodyPr lIns="0" rIns="0" tIns="0" bIns="0" anchor="ctr"/>
-          <a:p>
-            <a:endParaRPr b="0" lang="en-US" sz="1400" spc="-1" strike="noStrike">
-              <a:solidFill>
-                <a:srgbClr val="000000"/>
-              </a:solidFill>
-              <a:latin typeface="Arial"/>
-            </a:endParaRPr>
-          </a:p>
-        </p:txBody>
-      </p:sp>
-      <p:sp>
-        <p:nvSpPr>
-          <p:cNvPr id="21" name="PlaceHolder 2"/>
+            <a:off x="609480" y="273600"/>
+            <a:ext cx="10972440" cy="1144800"/>
+          </a:xfrm>
+          <a:prstGeom prst="rect">
+            <a:avLst/>
+          </a:prstGeom>
+        </p:spPr>
+        <p:txBody>
+          <a:bodyPr lIns="0" rIns="0" tIns="0" bIns="0" anchor="ctr">
+            <a:noAutofit/>
+          </a:bodyPr>
+          <a:p>
+            <a:pPr algn="ctr"/>
+            <a:endParaRPr b="0" lang="en-US" sz="4400" spc="-1" strike="noStrike">
+              <a:latin typeface="Arial"/>
+            </a:endParaRPr>
+          </a:p>
+        </p:txBody>
+      </p:sp>
+      <p:sp>
+        <p:nvSpPr>
+          <p:cNvPr id="18" name="PlaceHolder 2"/>
           <p:cNvSpPr>
             <a:spLocks noGrp="1"/>
           </p:cNvSpPr>
@@ -1691,8 +1649,8 @@
         </p:nvSpPr>
         <p:spPr>
           <a:xfrm>
-            <a:off x="828000" y="1528200"/>
-            <a:ext cx="5129640" cy="2232000"/>
+            <a:off x="609480" y="1604520"/>
+            <a:ext cx="5354280" cy="1896840"/>
           </a:xfrm>
           <a:prstGeom prst="rect">
             <a:avLst/>
@@ -1703,18 +1661,15 @@
             <a:normAutofit/>
           </a:bodyPr>
           <a:p>
-            <a:endParaRPr b="0" lang="en-US" sz="1400" spc="-1" strike="noStrike">
-              <a:solidFill>
-                <a:srgbClr val="000000"/>
-              </a:solidFill>
-              <a:latin typeface="Arial"/>
-            </a:endParaRPr>
-          </a:p>
-        </p:txBody>
-      </p:sp>
-      <p:sp>
-        <p:nvSpPr>
-          <p:cNvPr id="22" name="PlaceHolder 3"/>
+            <a:endParaRPr b="0" lang="en-US" sz="3200" spc="-1" strike="noStrike">
+              <a:latin typeface="Arial"/>
+            </a:endParaRPr>
+          </a:p>
+        </p:txBody>
+      </p:sp>
+      <p:sp>
+        <p:nvSpPr>
+          <p:cNvPr id="19" name="PlaceHolder 3"/>
           <p:cNvSpPr>
             <a:spLocks noGrp="1"/>
           </p:cNvSpPr>
@@ -1724,8 +1679,8 @@
         </p:nvSpPr>
         <p:spPr>
           <a:xfrm>
-            <a:off x="6214680" y="1528200"/>
-            <a:ext cx="5129640" cy="2232000"/>
+            <a:off x="6231960" y="1604520"/>
+            <a:ext cx="5354280" cy="1896840"/>
           </a:xfrm>
           <a:prstGeom prst="rect">
             <a:avLst/>
@@ -1736,18 +1691,15 @@
             <a:normAutofit/>
           </a:bodyPr>
           <a:p>
-            <a:endParaRPr b="0" lang="en-US" sz="1400" spc="-1" strike="noStrike">
-              <a:solidFill>
-                <a:srgbClr val="000000"/>
-              </a:solidFill>
-              <a:latin typeface="Arial"/>
-            </a:endParaRPr>
-          </a:p>
-        </p:txBody>
-      </p:sp>
-      <p:sp>
-        <p:nvSpPr>
-          <p:cNvPr id="23" name="PlaceHolder 4"/>
+            <a:endParaRPr b="0" lang="en-US" sz="3200" spc="-1" strike="noStrike">
+              <a:latin typeface="Arial"/>
+            </a:endParaRPr>
+          </a:p>
+        </p:txBody>
+      </p:sp>
+      <p:sp>
+        <p:nvSpPr>
+          <p:cNvPr id="20" name="PlaceHolder 4"/>
           <p:cNvSpPr>
             <a:spLocks noGrp="1"/>
           </p:cNvSpPr>
@@ -1757,8 +1709,8 @@
         </p:nvSpPr>
         <p:spPr>
           <a:xfrm>
-            <a:off x="828000" y="3972600"/>
-            <a:ext cx="10511640" cy="2232000"/>
+            <a:off x="609480" y="3682080"/>
+            <a:ext cx="10972440" cy="1896840"/>
           </a:xfrm>
           <a:prstGeom prst="rect">
             <a:avLst/>
@@ -1769,10 +1721,7 @@
             <a:normAutofit/>
           </a:bodyPr>
           <a:p>
-            <a:endParaRPr b="0" lang="en-US" sz="1400" spc="-1" strike="noStrike">
-              <a:solidFill>
-                <a:srgbClr val="000000"/>
-              </a:solidFill>
+            <a:endParaRPr b="0" lang="en-US" sz="3200" spc="-1" strike="noStrike">
               <a:latin typeface="Arial"/>
             </a:endParaRPr>
           </a:p>
@@ -1810,308 +1759,6 @@
           <a:chExt cx="0" cy="0"/>
         </a:xfrm>
       </p:grpSpPr>
-      <p:sp>
-        <p:nvSpPr>
-          <p:cNvPr id="0" name="PlaceHolder 1"/>
-          <p:cNvSpPr>
-            <a:spLocks noGrp="1"/>
-          </p:cNvSpPr>
-          <p:nvPr>
-            <p:ph type="title"/>
-          </p:nvPr>
-        </p:nvSpPr>
-        <p:spPr>
-          <a:xfrm>
-            <a:off x="952920" y="324000"/>
-            <a:ext cx="11231640" cy="906840"/>
-          </a:xfrm>
-          <a:prstGeom prst="rect">
-            <a:avLst/>
-          </a:prstGeom>
-        </p:spPr>
-        <p:txBody>
-          <a:bodyPr anchor="ctr"/>
-          <a:p>
-            <a:r>
-              <a:rPr b="0" lang="en-US" sz="3200" spc="-1" strike="noStrike">
-                <a:solidFill>
-                  <a:srgbClr val="000000"/>
-                </a:solidFill>
-                <a:latin typeface="Arial"/>
-              </a:rPr>
-              <a:t>Click to edit the title text format</a:t>
-            </a:r>
-            <a:endParaRPr b="0" lang="en-US" sz="3200" spc="-1" strike="noStrike">
-              <a:solidFill>
-                <a:srgbClr val="000000"/>
-              </a:solidFill>
-              <a:latin typeface="Arial"/>
-            </a:endParaRPr>
-          </a:p>
-        </p:txBody>
-      </p:sp>
-      <p:sp>
-        <p:nvSpPr>
-          <p:cNvPr id="1" name="PlaceHolder 2"/>
-          <p:cNvSpPr>
-            <a:spLocks noGrp="1"/>
-          </p:cNvSpPr>
-          <p:nvPr>
-            <p:ph type="body"/>
-          </p:nvPr>
-        </p:nvSpPr>
-        <p:spPr>
-          <a:xfrm>
-            <a:off x="828000" y="1528200"/>
-            <a:ext cx="10511640" cy="4679640"/>
-          </a:xfrm>
-          <a:prstGeom prst="rect">
-            <a:avLst/>
-          </a:prstGeom>
-        </p:spPr>
-        <p:txBody>
-          <a:bodyPr lIns="90000" tIns="46800"/>
-          <a:p>
-            <a:pPr marL="432000" indent="-324000">
-              <a:spcBef>
-                <a:spcPts val="1417"/>
-              </a:spcBef>
-              <a:buClr>
-                <a:srgbClr val="000000"/>
-              </a:buClr>
-              <a:buSzPct val="45000"/>
-              <a:buFont typeface="Wingdings" charset="2"/>
-              <a:buChar char=""/>
-            </a:pPr>
-            <a:r>
-              <a:rPr b="0" lang="en-US" sz="1800" spc="-1" strike="noStrike">
-                <a:solidFill>
-                  <a:srgbClr val="000000"/>
-                </a:solidFill>
-                <a:latin typeface="Arial"/>
-              </a:rPr>
-              <a:t>Click to edit the outline text format</a:t>
-            </a:r>
-            <a:endParaRPr b="0" lang="en-US" sz="1800" spc="-1" strike="noStrike">
-              <a:solidFill>
-                <a:srgbClr val="000000"/>
-              </a:solidFill>
-              <a:latin typeface="Arial"/>
-            </a:endParaRPr>
-          </a:p>
-          <a:p>
-            <a:pPr lvl="1" marL="864000" indent="-324000">
-              <a:spcBef>
-                <a:spcPts val="1134"/>
-              </a:spcBef>
-              <a:buClr>
-                <a:srgbClr val="000000"/>
-              </a:buClr>
-              <a:buSzPct val="75000"/>
-              <a:buFont typeface="Symbol" charset="2"/>
-              <a:buChar char=""/>
-            </a:pPr>
-            <a:r>
-              <a:rPr b="0" lang="en-US" sz="1800" spc="-1" strike="noStrike">
-                <a:solidFill>
-                  <a:srgbClr val="000000"/>
-                </a:solidFill>
-                <a:latin typeface="Arial"/>
-              </a:rPr>
-              <a:t>Second Outline Level</a:t>
-            </a:r>
-            <a:endParaRPr b="0" lang="en-US" sz="1800" spc="-1" strike="noStrike">
-              <a:solidFill>
-                <a:srgbClr val="000000"/>
-              </a:solidFill>
-              <a:latin typeface="Arial"/>
-            </a:endParaRPr>
-          </a:p>
-          <a:p>
-            <a:pPr lvl="2" marL="1296000" indent="-288000">
-              <a:spcBef>
-                <a:spcPts val="850"/>
-              </a:spcBef>
-              <a:buClr>
-                <a:srgbClr val="000000"/>
-              </a:buClr>
-              <a:buSzPct val="45000"/>
-              <a:buFont typeface="Wingdings" charset="2"/>
-              <a:buChar char=""/>
-            </a:pPr>
-            <a:r>
-              <a:rPr b="0" lang="en-US" sz="1800" spc="-1" strike="noStrike">
-                <a:solidFill>
-                  <a:srgbClr val="000000"/>
-                </a:solidFill>
-                <a:latin typeface="Arial"/>
-              </a:rPr>
-              <a:t>Third Outline Level</a:t>
-            </a:r>
-            <a:endParaRPr b="0" lang="en-US" sz="1800" spc="-1" strike="noStrike">
-              <a:solidFill>
-                <a:srgbClr val="000000"/>
-              </a:solidFill>
-              <a:latin typeface="Arial"/>
-            </a:endParaRPr>
-          </a:p>
-          <a:p>
-            <a:pPr lvl="3" marL="1728000" indent="-216000">
-              <a:spcBef>
-                <a:spcPts val="567"/>
-              </a:spcBef>
-              <a:buClr>
-                <a:srgbClr val="000000"/>
-              </a:buClr>
-              <a:buSzPct val="75000"/>
-              <a:buFont typeface="Symbol" charset="2"/>
-              <a:buChar char=""/>
-            </a:pPr>
-            <a:r>
-              <a:rPr b="0" lang="en-US" sz="1800" spc="-1" strike="noStrike">
-                <a:solidFill>
-                  <a:srgbClr val="000000"/>
-                </a:solidFill>
-                <a:latin typeface="Arial"/>
-              </a:rPr>
-              <a:t>Fourth Outline Level</a:t>
-            </a:r>
-            <a:endParaRPr b="0" lang="en-US" sz="1800" spc="-1" strike="noStrike">
-              <a:solidFill>
-                <a:srgbClr val="000000"/>
-              </a:solidFill>
-              <a:latin typeface="Arial"/>
-            </a:endParaRPr>
-          </a:p>
-          <a:p>
-            <a:pPr lvl="4" marL="2160000" indent="-216000">
-              <a:spcBef>
-                <a:spcPts val="283"/>
-              </a:spcBef>
-              <a:buClr>
-                <a:srgbClr val="000000"/>
-              </a:buClr>
-              <a:buSzPct val="45000"/>
-              <a:buFont typeface="Wingdings" charset="2"/>
-              <a:buChar char=""/>
-            </a:pPr>
-            <a:r>
-              <a:rPr b="0" lang="en-US" sz="1800" spc="-1" strike="noStrike">
-                <a:solidFill>
-                  <a:srgbClr val="000000"/>
-                </a:solidFill>
-                <a:latin typeface="Arial"/>
-              </a:rPr>
-              <a:t>Fifth Outline Level</a:t>
-            </a:r>
-            <a:endParaRPr b="0" lang="en-US" sz="1800" spc="-1" strike="noStrike">
-              <a:solidFill>
-                <a:srgbClr val="000000"/>
-              </a:solidFill>
-              <a:latin typeface="Arial"/>
-            </a:endParaRPr>
-          </a:p>
-          <a:p>
-            <a:pPr lvl="5" marL="2592000" indent="-216000">
-              <a:spcBef>
-                <a:spcPts val="283"/>
-              </a:spcBef>
-              <a:buClr>
-                <a:srgbClr val="000000"/>
-              </a:buClr>
-              <a:buSzPct val="45000"/>
-              <a:buFont typeface="Wingdings" charset="2"/>
-              <a:buChar char=""/>
-            </a:pPr>
-            <a:r>
-              <a:rPr b="0" lang="en-US" sz="1800" spc="-1" strike="noStrike">
-                <a:solidFill>
-                  <a:srgbClr val="000000"/>
-                </a:solidFill>
-                <a:latin typeface="Arial"/>
-              </a:rPr>
-              <a:t>Sixth Outline Level</a:t>
-            </a:r>
-            <a:endParaRPr b="0" lang="en-US" sz="1800" spc="-1" strike="noStrike">
-              <a:solidFill>
-                <a:srgbClr val="000000"/>
-              </a:solidFill>
-              <a:latin typeface="Arial"/>
-            </a:endParaRPr>
-          </a:p>
-          <a:p>
-            <a:pPr lvl="6" marL="3024000" indent="-216000">
-              <a:spcBef>
-                <a:spcPts val="283"/>
-              </a:spcBef>
-              <a:buClr>
-                <a:srgbClr val="000000"/>
-              </a:buClr>
-              <a:buSzPct val="45000"/>
-              <a:buFont typeface="Wingdings" charset="2"/>
-              <a:buChar char=""/>
-            </a:pPr>
-            <a:r>
-              <a:rPr b="0" lang="en-US" sz="1800" spc="-1" strike="noStrike">
-                <a:solidFill>
-                  <a:srgbClr val="000000"/>
-                </a:solidFill>
-                <a:latin typeface="Arial"/>
-              </a:rPr>
-              <a:t>Seventh Outline Level</a:t>
-            </a:r>
-            <a:endParaRPr b="0" lang="en-US" sz="1800" spc="-1" strike="noStrike">
-              <a:solidFill>
-                <a:srgbClr val="000000"/>
-              </a:solidFill>
-              <a:latin typeface="Arial"/>
-            </a:endParaRPr>
-          </a:p>
-        </p:txBody>
-      </p:sp>
-      <p:sp>
-        <p:nvSpPr>
-          <p:cNvPr id="2" name="PlaceHolder 3"/>
-          <p:cNvSpPr>
-            <a:spLocks noGrp="1"/>
-          </p:cNvSpPr>
-          <p:nvPr>
-            <p:ph type="sldNum"/>
-          </p:nvPr>
-        </p:nvSpPr>
-        <p:spPr>
-          <a:xfrm>
-            <a:off x="11340000" y="6537240"/>
-            <a:ext cx="833760" cy="298080"/>
-          </a:xfrm>
-          <a:prstGeom prst="rect">
-            <a:avLst/>
-          </a:prstGeom>
-        </p:spPr>
-        <p:txBody>
-          <a:bodyPr anchor="ctr"/>
-          <a:p>
-            <a:pPr algn="ctr">
-              <a:lnSpc>
-                <a:spcPct val="100000"/>
-              </a:lnSpc>
-            </a:pPr>
-            <a:fld id="{C00FFBF6-E420-4459-947B-E07C91E640ED}" type="slidenum">
-              <a:rPr b="0" lang="en-US" sz="1600" spc="-1" strike="noStrike">
-                <a:solidFill>
-                  <a:srgbClr val="ffffff"/>
-                </a:solidFill>
-                <a:latin typeface="Helvetica Neue Light"/>
-                <a:ea typeface="Helvetica Neue Light"/>
-              </a:rPr>
-              <a:t>&lt;number&gt;</a:t>
-            </a:fld>
-            <a:endParaRPr b="0" lang="en-US" sz="1600" spc="-1" strike="noStrike">
-              <a:latin typeface="Times New Roman"/>
-            </a:endParaRPr>
-          </a:p>
-        </p:txBody>
-      </p:sp>
     </p:spTree>
   </p:cSld>
   <p:clrMap bg1="lt1" bg2="lt2" tx1="dk1" tx2="dk2" accent1="accent1" accent2="accent2" accent3="accent3" accent4="accent4" accent5="accent5" accent6="accent6" hlink="hlink" folHlink="folHlink"/>
@@ -2151,14 +1798,14 @@
       </p:grpSpPr>
       <p:sp>
         <p:nvSpPr>
-          <p:cNvPr id="45" name="CustomShape 1"/>
+          <p:cNvPr id="42" name="CustomShape 1"/>
           <p:cNvSpPr/>
           <p:nvPr/>
         </p:nvSpPr>
         <p:spPr>
           <a:xfrm>
             <a:off x="603000" y="1425240"/>
-            <a:ext cx="8413920" cy="2752920"/>
+            <a:ext cx="8413560" cy="2752560"/>
           </a:xfrm>
           <a:prstGeom prst="rect">
             <a:avLst/>
@@ -2179,14 +1826,14 @@
       </p:sp>
       <p:sp>
         <p:nvSpPr>
-          <p:cNvPr id="46" name="TextShape 2"/>
-          <p:cNvSpPr txBox="1"/>
+          <p:cNvPr id="43" name="CustomShape 2"/>
+          <p:cNvSpPr/>
           <p:nvPr/>
         </p:nvSpPr>
         <p:spPr>
           <a:xfrm>
             <a:off x="952920" y="324000"/>
-            <a:ext cx="11231640" cy="906840"/>
+            <a:ext cx="11231280" cy="906480"/>
           </a:xfrm>
           <a:prstGeom prst="rect">
             <a:avLst/>
@@ -2196,8 +1843,16 @@
             <a:noFill/>
           </a:ln>
         </p:spPr>
-        <p:txBody>
-          <a:bodyPr anchor="ctr"/>
+        <p:style>
+          <a:lnRef idx="0"/>
+          <a:fillRef idx="0"/>
+          <a:effectRef idx="0"/>
+          <a:fontRef idx="minor"/>
+        </p:style>
+        <p:txBody>
+          <a:bodyPr lIns="90000" rIns="90000" tIns="45000" bIns="45000" anchor="ctr">
+            <a:noAutofit/>
+          </a:bodyPr>
           <a:p>
             <a:pPr>
               <a:lnSpc>
@@ -2215,24 +1870,21 @@
               <a:t>Capstone Components</a:t>
             </a:r>
             <a:endParaRPr b="0" lang="en-US" sz="3200" spc="-1" strike="noStrike">
-              <a:solidFill>
-                <a:srgbClr val="000000"/>
-              </a:solidFill>
-              <a:latin typeface="Arial"/>
-            </a:endParaRPr>
-          </a:p>
-        </p:txBody>
-      </p:sp>
-      <p:sp>
-        <p:nvSpPr>
-          <p:cNvPr id="47" name="TextShape 3"/>
-          <p:cNvSpPr txBox="1"/>
+              <a:latin typeface="Arial"/>
+            </a:endParaRPr>
+          </a:p>
+        </p:txBody>
+      </p:sp>
+      <p:sp>
+        <p:nvSpPr>
+          <p:cNvPr id="44" name="CustomShape 3"/>
+          <p:cNvSpPr/>
           <p:nvPr/>
         </p:nvSpPr>
         <p:spPr>
           <a:xfrm>
             <a:off x="11340000" y="6537240"/>
-            <a:ext cx="833760" cy="298080"/>
+            <a:ext cx="833400" cy="297720"/>
           </a:xfrm>
           <a:prstGeom prst="rect">
             <a:avLst/>
@@ -2242,15 +1894,23 @@
             <a:noFill/>
           </a:ln>
         </p:spPr>
-        <p:txBody>
-          <a:bodyPr anchor="ctr"/>
+        <p:style>
+          <a:lnRef idx="0"/>
+          <a:fillRef idx="0"/>
+          <a:effectRef idx="0"/>
+          <a:fontRef idx="minor"/>
+        </p:style>
+        <p:txBody>
+          <a:bodyPr lIns="90000" rIns="90000" tIns="45000" bIns="45000" anchor="ctr">
+            <a:noAutofit/>
+          </a:bodyPr>
           <a:p>
             <a:pPr algn="ctr">
               <a:lnSpc>
                 <a:spcPct val="100000"/>
               </a:lnSpc>
             </a:pPr>
-            <a:fld id="{65585B95-6CB1-45DE-93D9-C34A1E7021BF}" type="slidenum">
+            <a:fld id="{7E6A4C19-4346-4A8C-8D22-9C770F7E640F}" type="slidenum">
               <a:rPr b="0" lang="en-US" sz="1600" spc="-1" strike="noStrike">
                 <a:solidFill>
                   <a:srgbClr val="ffffff"/>
@@ -2261,49 +1921,49 @@
               <a:t>&lt;number&gt;</a:t>
             </a:fld>
             <a:endParaRPr b="0" lang="en-US" sz="1600" spc="-1" strike="noStrike">
-              <a:latin typeface="Times New Roman"/>
+              <a:latin typeface="Arial"/>
             </a:endParaRPr>
           </a:p>
         </p:txBody>
       </p:sp>
       <p:grpSp>
         <p:nvGrpSpPr>
-          <p:cNvPr id="48" name="Group 4"/>
+          <p:cNvPr id="45" name="Group 4"/>
           <p:cNvGrpSpPr/>
           <p:nvPr/>
         </p:nvGrpSpPr>
         <p:grpSpPr>
           <a:xfrm>
             <a:off x="957240" y="1650600"/>
-            <a:ext cx="2828880" cy="2343240"/>
+            <a:ext cx="2828520" cy="2342880"/>
             <a:chOff x="957240" y="1650600"/>
-            <a:chExt cx="2828880" cy="2343240"/>
+            <a:chExt cx="2828520" cy="2342880"/>
           </a:xfrm>
         </p:grpSpPr>
         <p:grpSp>
           <p:nvGrpSpPr>
-            <p:cNvPr id="49" name="Group 5"/>
+            <p:cNvPr id="46" name="Group 5"/>
             <p:cNvGrpSpPr/>
             <p:nvPr/>
           </p:nvGrpSpPr>
           <p:grpSpPr>
             <a:xfrm>
               <a:off x="957240" y="1650600"/>
-              <a:ext cx="2397240" cy="2343240"/>
+              <a:ext cx="2396880" cy="2342880"/>
               <a:chOff x="957240" y="1650600"/>
-              <a:chExt cx="2397240" cy="2343240"/>
+              <a:chExt cx="2396880" cy="2342880"/>
             </a:xfrm>
           </p:grpSpPr>
           <p:sp>
             <p:nvSpPr>
-              <p:cNvPr id="50" name="CustomShape 6"/>
+              <p:cNvPr id="47" name="CustomShape 6"/>
               <p:cNvSpPr/>
               <p:nvPr/>
             </p:nvSpPr>
             <p:spPr>
               <a:xfrm>
                 <a:off x="1036080" y="1751040"/>
-                <a:ext cx="2318400" cy="2242800"/>
+                <a:ext cx="2318040" cy="2242440"/>
               </a:xfrm>
               <a:prstGeom prst="roundRect">
                 <a:avLst>
@@ -2326,14 +1986,14 @@
           </p:sp>
           <p:sp>
             <p:nvSpPr>
-              <p:cNvPr id="51" name="CustomShape 7"/>
+              <p:cNvPr id="48" name="CustomShape 7"/>
               <p:cNvSpPr/>
               <p:nvPr/>
             </p:nvSpPr>
             <p:spPr>
               <a:xfrm>
                 <a:off x="957240" y="1650600"/>
-                <a:ext cx="2318400" cy="2242800"/>
+                <a:ext cx="2318040" cy="2242440"/>
               </a:xfrm>
               <a:prstGeom prst="roundRect">
                 <a:avLst>
@@ -2357,7 +2017,9 @@
               <a:fontRef idx="minor"/>
             </p:style>
             <p:txBody>
-              <a:bodyPr tIns="91440" bIns="91440"/>
+              <a:bodyPr lIns="90000" rIns="90000" tIns="91440" bIns="91440">
+                <a:noAutofit/>
+              </a:bodyPr>
               <a:p>
                 <a:pPr algn="ctr">
                   <a:lnSpc>
@@ -2383,14 +2045,14 @@
         </p:grpSp>
         <p:sp>
           <p:nvSpPr>
-            <p:cNvPr id="52" name="CustomShape 8"/>
+            <p:cNvPr id="49" name="CustomShape 8"/>
             <p:cNvSpPr/>
             <p:nvPr/>
           </p:nvSpPr>
           <p:spPr>
             <a:xfrm>
               <a:off x="1143000" y="2106000"/>
-              <a:ext cx="2643120" cy="1165320"/>
+              <a:ext cx="2642760" cy="1164960"/>
             </a:xfrm>
             <a:prstGeom prst="rect">
               <a:avLst/>
@@ -2407,7 +2069,9 @@
             <a:fontRef idx="minor"/>
           </p:style>
           <p:txBody>
-            <a:bodyPr tIns="91440" bIns="91440"/>
+            <a:bodyPr lIns="90000" rIns="90000" tIns="91440" bIns="91440">
+              <a:noAutofit/>
+            </a:bodyPr>
             <a:p>
               <a:pPr>
                 <a:lnSpc>
@@ -2515,28 +2179,28 @@
       </p:grpSp>
       <p:grpSp>
         <p:nvGrpSpPr>
-          <p:cNvPr id="53" name="Group 9"/>
+          <p:cNvPr id="50" name="Group 9"/>
           <p:cNvGrpSpPr/>
           <p:nvPr/>
         </p:nvGrpSpPr>
         <p:grpSpPr>
           <a:xfrm>
             <a:off x="5015520" y="4423680"/>
-            <a:ext cx="3749040" cy="1777320"/>
+            <a:ext cx="3748680" cy="1776960"/>
             <a:chOff x="5015520" y="4423680"/>
-            <a:chExt cx="3749040" cy="1777320"/>
+            <a:chExt cx="3748680" cy="1776960"/>
           </a:xfrm>
         </p:grpSpPr>
         <p:sp>
           <p:nvSpPr>
-            <p:cNvPr id="54" name="CustomShape 10"/>
+            <p:cNvPr id="51" name="CustomShape 10"/>
             <p:cNvSpPr/>
             <p:nvPr/>
           </p:nvSpPr>
           <p:spPr>
             <a:xfrm>
               <a:off x="5113440" y="4485600"/>
-              <a:ext cx="3651120" cy="1715400"/>
+              <a:ext cx="3650760" cy="1715040"/>
             </a:xfrm>
             <a:prstGeom prst="cloud">
               <a:avLst/>
@@ -2560,14 +2224,14 @@
         </p:sp>
         <p:sp>
           <p:nvSpPr>
-            <p:cNvPr id="55" name="CustomShape 11"/>
+            <p:cNvPr id="52" name="CustomShape 11"/>
             <p:cNvSpPr/>
             <p:nvPr/>
           </p:nvSpPr>
           <p:spPr>
             <a:xfrm>
               <a:off x="5015520" y="4423680"/>
-              <a:ext cx="3651120" cy="1715400"/>
+              <a:ext cx="3650760" cy="1715040"/>
             </a:xfrm>
             <a:prstGeom prst="cloud">
               <a:avLst/>
@@ -2592,14 +2256,14 @@
       </p:grpSp>
       <p:sp>
         <p:nvSpPr>
-          <p:cNvPr id="56" name="CustomShape 12"/>
+          <p:cNvPr id="53" name="CustomShape 12"/>
           <p:cNvSpPr/>
           <p:nvPr/>
         </p:nvSpPr>
         <p:spPr>
           <a:xfrm>
             <a:off x="5650560" y="4758480"/>
-            <a:ext cx="2912040" cy="1320120"/>
+            <a:ext cx="2911680" cy="1319760"/>
           </a:xfrm>
           <a:prstGeom prst="rect">
             <a:avLst/>
@@ -2616,7 +2280,9 @@
           <a:fontRef idx="minor"/>
         </p:style>
         <p:txBody>
-          <a:bodyPr tIns="91440" bIns="91440"/>
+          <a:bodyPr lIns="90000" rIns="90000" tIns="91440" bIns="91440">
+            <a:noAutofit/>
+          </a:bodyPr>
           <a:p>
             <a:pPr>
               <a:lnSpc>
@@ -2721,28 +2387,28 @@
       </p:sp>
       <p:grpSp>
         <p:nvGrpSpPr>
-          <p:cNvPr id="57" name="Group 13"/>
+          <p:cNvPr id="54" name="Group 13"/>
           <p:cNvGrpSpPr/>
           <p:nvPr/>
         </p:nvGrpSpPr>
         <p:grpSpPr>
           <a:xfrm>
             <a:off x="9266400" y="1466280"/>
-            <a:ext cx="2752920" cy="4829760"/>
+            <a:ext cx="2752560" cy="4829400"/>
             <a:chOff x="9266400" y="1466280"/>
-            <a:chExt cx="2752920" cy="4829760"/>
+            <a:chExt cx="2752560" cy="4829400"/>
           </a:xfrm>
         </p:grpSpPr>
         <p:sp>
           <p:nvSpPr>
-            <p:cNvPr id="58" name="CustomShape 14"/>
+            <p:cNvPr id="55" name="CustomShape 14"/>
             <p:cNvSpPr/>
             <p:nvPr/>
           </p:nvSpPr>
           <p:spPr>
             <a:xfrm>
               <a:off x="9266400" y="1466280"/>
-              <a:ext cx="2752920" cy="4829760"/>
+              <a:ext cx="2752560" cy="4829400"/>
             </a:xfrm>
             <a:prstGeom prst="rect">
               <a:avLst/>
@@ -2764,7 +2430,9 @@
             <a:fontRef idx="minor"/>
           </p:style>
           <p:txBody>
-            <a:bodyPr tIns="91440" bIns="91440"/>
+            <a:bodyPr lIns="90000" rIns="90000" tIns="91440" bIns="91440">
+              <a:noAutofit/>
+            </a:bodyPr>
             <a:p>
               <a:pPr algn="ctr">
                 <a:lnSpc>
@@ -2779,7 +2447,7 @@
                   <a:latin typeface="Arial"/>
                   <a:ea typeface="Arial"/>
                 </a:rPr>
-                <a:t>BitBucket</a:t>
+                <a:t>Github</a:t>
               </a:r>
               <a:endParaRPr b="0" lang="en-US" sz="1400" spc="-1" strike="noStrike">
                 <a:latin typeface="Arial"/>
@@ -2789,14 +2457,14 @@
         </p:sp>
         <p:sp>
           <p:nvSpPr>
-            <p:cNvPr id="59" name="CustomShape 15"/>
+            <p:cNvPr id="56" name="CustomShape 15"/>
             <p:cNvSpPr/>
             <p:nvPr/>
           </p:nvSpPr>
           <p:spPr>
             <a:xfrm>
               <a:off x="9355680" y="1922040"/>
-              <a:ext cx="2574360" cy="3791520"/>
+              <a:ext cx="2574000" cy="3791160"/>
             </a:xfrm>
             <a:prstGeom prst="rect">
               <a:avLst/>
@@ -2813,7 +2481,9 @@
             <a:fontRef idx="minor"/>
           </p:style>
           <p:txBody>
-            <a:bodyPr tIns="91440" bIns="91440"/>
+            <a:bodyPr lIns="90000" rIns="90000" tIns="91440" bIns="91440">
+              <a:noAutofit/>
+            </a:bodyPr>
             <a:p>
               <a:pPr>
                 <a:lnSpc>
@@ -3289,42 +2959,42 @@
       </p:grpSp>
       <p:grpSp>
         <p:nvGrpSpPr>
-          <p:cNvPr id="60" name="Group 16"/>
+          <p:cNvPr id="57" name="Group 16"/>
           <p:cNvGrpSpPr/>
           <p:nvPr/>
         </p:nvGrpSpPr>
         <p:grpSpPr>
           <a:xfrm>
             <a:off x="3596400" y="1650240"/>
-            <a:ext cx="2444040" cy="2343600"/>
+            <a:ext cx="2443680" cy="2343240"/>
             <a:chOff x="3596400" y="1650240"/>
-            <a:chExt cx="2444040" cy="2343600"/>
+            <a:chExt cx="2443680" cy="2343240"/>
           </a:xfrm>
         </p:grpSpPr>
         <p:grpSp>
           <p:nvGrpSpPr>
-            <p:cNvPr id="61" name="Group 17"/>
+            <p:cNvPr id="58" name="Group 17"/>
             <p:cNvGrpSpPr/>
             <p:nvPr/>
           </p:nvGrpSpPr>
           <p:grpSpPr>
             <a:xfrm>
               <a:off x="3596400" y="1650240"/>
-              <a:ext cx="2444040" cy="2343600"/>
+              <a:ext cx="2443680" cy="2343240"/>
               <a:chOff x="3596400" y="1650240"/>
-              <a:chExt cx="2444040" cy="2343600"/>
+              <a:chExt cx="2443680" cy="2343240"/>
             </a:xfrm>
           </p:grpSpPr>
           <p:sp>
             <p:nvSpPr>
-              <p:cNvPr id="62" name="CustomShape 18"/>
+              <p:cNvPr id="59" name="CustomShape 18"/>
               <p:cNvSpPr/>
               <p:nvPr/>
             </p:nvSpPr>
             <p:spPr>
               <a:xfrm>
                 <a:off x="3722040" y="1751040"/>
-                <a:ext cx="2318400" cy="2242800"/>
+                <a:ext cx="2318040" cy="2242440"/>
               </a:xfrm>
               <a:prstGeom prst="roundRect">
                 <a:avLst>
@@ -3347,14 +3017,14 @@
           </p:sp>
           <p:sp>
             <p:nvSpPr>
-              <p:cNvPr id="63" name="CustomShape 19"/>
+              <p:cNvPr id="60" name="CustomShape 19"/>
               <p:cNvSpPr/>
               <p:nvPr/>
             </p:nvSpPr>
             <p:spPr>
               <a:xfrm>
                 <a:off x="3596400" y="1650240"/>
-                <a:ext cx="2318400" cy="2242800"/>
+                <a:ext cx="2318040" cy="2242440"/>
               </a:xfrm>
               <a:prstGeom prst="roundRect">
                 <a:avLst>
@@ -3378,7 +3048,9 @@
               <a:fontRef idx="minor"/>
             </p:style>
             <p:txBody>
-              <a:bodyPr tIns="91440" bIns="91440"/>
+              <a:bodyPr lIns="90000" rIns="90000" tIns="91440" bIns="91440">
+                <a:noAutofit/>
+              </a:bodyPr>
               <a:p>
                 <a:pPr algn="ctr">
                   <a:lnSpc>
@@ -3404,14 +3076,14 @@
         </p:grpSp>
         <p:sp>
           <p:nvSpPr>
-            <p:cNvPr id="64" name="CustomShape 20"/>
+            <p:cNvPr id="61" name="CustomShape 20"/>
             <p:cNvSpPr/>
             <p:nvPr/>
           </p:nvSpPr>
           <p:spPr>
             <a:xfrm>
               <a:off x="4155840" y="2676240"/>
-              <a:ext cx="1086120" cy="392400"/>
+              <a:ext cx="1085760" cy="392040"/>
             </a:xfrm>
             <a:prstGeom prst="roundRect">
               <a:avLst>
@@ -3435,7 +3107,9 @@
             <a:fontRef idx="minor"/>
           </p:style>
           <p:txBody>
-            <a:bodyPr tIns="91440" bIns="91440"/>
+            <a:bodyPr lIns="90000" rIns="90000" tIns="91440" bIns="91440">
+              <a:noAutofit/>
+            </a:bodyPr>
             <a:p>
               <a:pPr>
                 <a:lnSpc>
@@ -3460,14 +3134,14 @@
         </p:sp>
         <p:sp>
           <p:nvSpPr>
-            <p:cNvPr id="65" name="CustomShape 21"/>
+            <p:cNvPr id="62" name="CustomShape 21"/>
             <p:cNvSpPr/>
             <p:nvPr/>
           </p:nvSpPr>
           <p:spPr>
             <a:xfrm>
               <a:off x="4339440" y="2185560"/>
-              <a:ext cx="1310760" cy="298080"/>
+              <a:ext cx="1310400" cy="297720"/>
             </a:xfrm>
             <a:prstGeom prst="rect">
               <a:avLst/>
@@ -3484,7 +3158,9 @@
             <a:fontRef idx="minor"/>
           </p:style>
           <p:txBody>
-            <a:bodyPr tIns="91440" bIns="91440"/>
+            <a:bodyPr lIns="90000" rIns="90000" tIns="91440" bIns="91440">
+              <a:noAutofit/>
+            </a:bodyPr>
             <a:p>
               <a:pPr>
                 <a:lnSpc>
@@ -3510,42 +3186,42 @@
       </p:grpSp>
       <p:grpSp>
         <p:nvGrpSpPr>
-          <p:cNvPr id="66" name="Group 22"/>
+          <p:cNvPr id="63" name="Group 22"/>
           <p:cNvGrpSpPr/>
           <p:nvPr/>
         </p:nvGrpSpPr>
         <p:grpSpPr>
           <a:xfrm>
             <a:off x="6235560" y="1609560"/>
-            <a:ext cx="2426760" cy="2332440"/>
+            <a:ext cx="2426400" cy="2332080"/>
             <a:chOff x="6235560" y="1609560"/>
-            <a:chExt cx="2426760" cy="2332440"/>
+            <a:chExt cx="2426400" cy="2332080"/>
           </a:xfrm>
         </p:grpSpPr>
         <p:grpSp>
           <p:nvGrpSpPr>
-            <p:cNvPr id="67" name="Group 23"/>
+            <p:cNvPr id="64" name="Group 23"/>
             <p:cNvGrpSpPr/>
             <p:nvPr/>
           </p:nvGrpSpPr>
           <p:grpSpPr>
             <a:xfrm>
               <a:off x="6235560" y="1609560"/>
-              <a:ext cx="2426760" cy="2332440"/>
+              <a:ext cx="2426400" cy="2332080"/>
               <a:chOff x="6235560" y="1609560"/>
-              <a:chExt cx="2426760" cy="2332440"/>
+              <a:chExt cx="2426400" cy="2332080"/>
             </a:xfrm>
           </p:grpSpPr>
           <p:sp>
             <p:nvSpPr>
-              <p:cNvPr id="68" name="CustomShape 24"/>
+              <p:cNvPr id="65" name="CustomShape 24"/>
               <p:cNvSpPr/>
               <p:nvPr/>
             </p:nvSpPr>
             <p:spPr>
               <a:xfrm>
                 <a:off x="6343920" y="1699200"/>
-                <a:ext cx="2318400" cy="2242800"/>
+                <a:ext cx="2318040" cy="2242440"/>
               </a:xfrm>
               <a:prstGeom prst="roundRect">
                 <a:avLst>
@@ -3568,14 +3244,14 @@
           </p:sp>
           <p:sp>
             <p:nvSpPr>
-              <p:cNvPr id="69" name="CustomShape 25"/>
+              <p:cNvPr id="66" name="CustomShape 25"/>
               <p:cNvSpPr/>
               <p:nvPr/>
             </p:nvSpPr>
             <p:spPr>
               <a:xfrm>
                 <a:off x="6235560" y="1609560"/>
-                <a:ext cx="2318400" cy="2242800"/>
+                <a:ext cx="2318040" cy="2242440"/>
               </a:xfrm>
               <a:prstGeom prst="roundRect">
                 <a:avLst>
@@ -3599,7 +3275,9 @@
               <a:fontRef idx="minor"/>
             </p:style>
             <p:txBody>
-              <a:bodyPr tIns="91440" bIns="91440"/>
+              <a:bodyPr lIns="90000" rIns="90000" tIns="91440" bIns="91440">
+                <a:noAutofit/>
+              </a:bodyPr>
               <a:p>
                 <a:pPr algn="ctr">
                   <a:lnSpc>
@@ -3625,14 +3303,14 @@
         </p:grpSp>
         <p:sp>
           <p:nvSpPr>
-            <p:cNvPr id="70" name="CustomShape 26"/>
+            <p:cNvPr id="67" name="CustomShape 26"/>
             <p:cNvSpPr/>
             <p:nvPr/>
           </p:nvSpPr>
           <p:spPr>
             <a:xfrm>
               <a:off x="6344280" y="2560320"/>
-              <a:ext cx="1086120" cy="392400"/>
+              <a:ext cx="1085760" cy="392040"/>
             </a:xfrm>
             <a:prstGeom prst="roundRect">
               <a:avLst>
@@ -3656,7 +3334,9 @@
             <a:fontRef idx="minor"/>
           </p:style>
           <p:txBody>
-            <a:bodyPr tIns="91440" bIns="91440"/>
+            <a:bodyPr lIns="90000" rIns="90000" tIns="91440" bIns="91440">
+              <a:noAutofit/>
+            </a:bodyPr>
             <a:p>
               <a:pPr>
                 <a:lnSpc>
@@ -3681,14 +3361,14 @@
         </p:sp>
         <p:sp>
           <p:nvSpPr>
-            <p:cNvPr id="71" name="CustomShape 27"/>
+            <p:cNvPr id="68" name="CustomShape 27"/>
             <p:cNvSpPr/>
             <p:nvPr/>
           </p:nvSpPr>
           <p:spPr>
             <a:xfrm>
               <a:off x="6966000" y="2158200"/>
-              <a:ext cx="1354320" cy="298080"/>
+              <a:ext cx="1353960" cy="297720"/>
             </a:xfrm>
             <a:prstGeom prst="rect">
               <a:avLst/>
@@ -3705,7 +3385,9 @@
             <a:fontRef idx="minor"/>
           </p:style>
           <p:txBody>
-            <a:bodyPr tIns="91440" bIns="91440"/>
+            <a:bodyPr lIns="90000" rIns="90000" tIns="91440" bIns="91440">
+              <a:noAutofit/>
+            </a:bodyPr>
             <a:p>
               <a:pPr>
                 <a:lnSpc>
@@ -3730,14 +3412,14 @@
         </p:sp>
         <p:sp>
           <p:nvSpPr>
-            <p:cNvPr id="72" name="CustomShape 28"/>
+            <p:cNvPr id="69" name="CustomShape 28"/>
             <p:cNvSpPr/>
             <p:nvPr/>
           </p:nvSpPr>
           <p:spPr>
             <a:xfrm>
               <a:off x="6408000" y="3157200"/>
-              <a:ext cx="1973520" cy="392400"/>
+              <a:ext cx="1973160" cy="392040"/>
             </a:xfrm>
             <a:prstGeom prst="roundRect">
               <a:avLst>
@@ -3761,7 +3443,9 @@
             <a:fontRef idx="minor"/>
           </p:style>
           <p:txBody>
-            <a:bodyPr tIns="91440" bIns="91440"/>
+            <a:bodyPr lIns="90000" rIns="90000" tIns="91440" bIns="91440">
+              <a:noAutofit/>
+            </a:bodyPr>
             <a:p>
               <a:pPr algn="ctr">
                 <a:lnSpc>
@@ -3787,28 +3471,28 @@
       </p:grpSp>
       <p:grpSp>
         <p:nvGrpSpPr>
-          <p:cNvPr id="73" name="Group 29"/>
+          <p:cNvPr id="70" name="Group 29"/>
           <p:cNvGrpSpPr/>
           <p:nvPr/>
         </p:nvGrpSpPr>
         <p:grpSpPr>
           <a:xfrm>
             <a:off x="652320" y="4423680"/>
-            <a:ext cx="2643120" cy="1828440"/>
+            <a:ext cx="2642760" cy="1828080"/>
             <a:chOff x="652320" y="4423680"/>
-            <a:chExt cx="2643120" cy="1828440"/>
+            <a:chExt cx="2642760" cy="1828080"/>
           </a:xfrm>
         </p:grpSpPr>
         <p:sp>
           <p:nvSpPr>
-            <p:cNvPr id="74" name="CustomShape 30"/>
+            <p:cNvPr id="71" name="CustomShape 30"/>
             <p:cNvSpPr/>
             <p:nvPr/>
           </p:nvSpPr>
           <p:spPr>
             <a:xfrm>
               <a:off x="652320" y="4423680"/>
-              <a:ext cx="2643120" cy="1828440"/>
+              <a:ext cx="2642760" cy="1828080"/>
             </a:xfrm>
             <a:prstGeom prst="rect">
               <a:avLst/>
@@ -3830,7 +3514,9 @@
             <a:fontRef idx="minor"/>
           </p:style>
           <p:txBody>
-            <a:bodyPr tIns="91440" bIns="91440"/>
+            <a:bodyPr lIns="90000" rIns="90000" tIns="91440" bIns="91440">
+              <a:noAutofit/>
+            </a:bodyPr>
             <a:p>
               <a:pPr algn="ctr">
                 <a:lnSpc>
@@ -3855,14 +3541,14 @@
         </p:sp>
         <p:sp>
           <p:nvSpPr>
-            <p:cNvPr id="75" name="CustomShape 31"/>
+            <p:cNvPr id="72" name="CustomShape 31"/>
             <p:cNvSpPr/>
             <p:nvPr/>
           </p:nvSpPr>
           <p:spPr>
             <a:xfrm>
               <a:off x="836280" y="4929840"/>
-              <a:ext cx="2129760" cy="1027080"/>
+              <a:ext cx="2129400" cy="1026720"/>
             </a:xfrm>
             <a:prstGeom prst="rect">
               <a:avLst/>
@@ -3879,7 +3565,9 @@
             <a:fontRef idx="minor"/>
           </p:style>
           <p:txBody>
-            <a:bodyPr tIns="91440" bIns="91440"/>
+            <a:bodyPr lIns="90000" rIns="90000" tIns="91440" bIns="91440">
+              <a:noAutofit/>
+            </a:bodyPr>
             <a:p>
               <a:pPr>
                 <a:lnSpc>
@@ -3985,14 +3673,14 @@
       </p:grpSp>
       <p:sp>
         <p:nvSpPr>
-          <p:cNvPr id="76" name="CustomShape 32"/>
+          <p:cNvPr id="73" name="CustomShape 32"/>
           <p:cNvSpPr/>
           <p:nvPr/>
         </p:nvSpPr>
         <p:spPr>
           <a:xfrm>
             <a:off x="4286160" y="3412800"/>
-            <a:ext cx="1069920" cy="298080"/>
+            <a:ext cx="1069560" cy="297720"/>
           </a:xfrm>
           <a:prstGeom prst="flowChartMagneticDisk">
             <a:avLst/>
@@ -4014,7 +3702,9 @@
           <a:fontRef idx="minor"/>
         </p:style>
         <p:txBody>
-          <a:bodyPr tIns="91440" bIns="91440" anchor="ctr"/>
+          <a:bodyPr lIns="90000" rIns="90000" tIns="91440" bIns="91440" anchor="ctr">
+            <a:noAutofit/>
+          </a:bodyPr>
           <a:p>
             <a:pPr algn="ctr">
               <a:lnSpc>
@@ -4039,14 +3729,14 @@
       </p:sp>
       <p:sp>
         <p:nvSpPr>
-          <p:cNvPr id="77" name="CustomShape 33"/>
+          <p:cNvPr id="74" name="CustomShape 33"/>
           <p:cNvSpPr/>
           <p:nvPr/>
         </p:nvSpPr>
         <p:spPr>
           <a:xfrm>
             <a:off x="7516080" y="2769480"/>
-            <a:ext cx="1069920" cy="298080"/>
+            <a:ext cx="1069560" cy="297720"/>
           </a:xfrm>
           <a:prstGeom prst="flowChartMagneticDisk">
             <a:avLst/>
@@ -4068,7 +3758,9 @@
           <a:fontRef idx="minor"/>
         </p:style>
         <p:txBody>
-          <a:bodyPr tIns="91440" bIns="91440" anchor="ctr"/>
+          <a:bodyPr lIns="90000" rIns="90000" tIns="91440" bIns="91440" anchor="ctr">
+            <a:noAutofit/>
+          </a:bodyPr>
           <a:p>
             <a:pPr algn="ctr">
               <a:lnSpc>
@@ -4093,33 +3785,14 @@
       </p:sp>
     </p:spTree>
   </p:cSld>
-  <p:timing>
-    <p:tnLst>
-      <p:par>
-        <p:cTn id="1" dur="indefinite" restart="never" nodeType="tmRoot">
-          <p:childTnLst>
-            <p:seq>
-              <p:cTn id="2" dur="indefinite" nodeType="mainSeq"/>
-              <p:prevCondLst>
-                <p:cond delay="0" evt="onPrev">
-                  <p:tgtEl>
-                    <p:sldTgt/>
-                  </p:tgtEl>
-                </p:cond>
-              </p:prevCondLst>
-              <p:nextCondLst>
-                <p:cond delay="0" evt="onNext">
-                  <p:tgtEl>
-                    <p:sldTgt/>
-                  </p:tgtEl>
-                </p:cond>
-              </p:nextCondLst>
-            </p:seq>
-          </p:childTnLst>
-        </p:cTn>
-      </p:par>
-    </p:tnLst>
-  </p:timing>
+  <mc:AlternateContent>
+    <mc:Choice Requires="p14">
+      <p:transition spd="slow" p14:dur="2000"/>
+    </mc:Choice>
+    <mc:Fallback>
+      <p:transition spd="slow"/>
+    </mc:Fallback>
+  </mc:AlternateContent>
 </p:sld>
 </file>
 
@@ -4237,18 +3910,21 @@
             </a:schemeClr>
           </a:solidFill>
           <a:prstDash val="solid"/>
+          <a:miter/>
         </a:ln>
         <a:ln w="25400" cap="flat" cmpd="sng" algn="ctr">
           <a:solidFill>
             <a:schemeClr val="phClr"/>
           </a:solidFill>
           <a:prstDash val="solid"/>
+          <a:miter/>
         </a:ln>
         <a:ln w="38100" cap="flat" cmpd="sng" algn="ctr">
           <a:solidFill>
             <a:schemeClr val="phClr"/>
           </a:solidFill>
           <a:prstDash val="solid"/>
+          <a:miter/>
         </a:ln>
       </a:lnStyleLst>
       <a:effectStyleLst>
@@ -4357,34 +4033,34 @@
         <a:sysClr val="window" lastClr="FFFFFF"/>
       </a:lt1>
       <a:dk2>
-        <a:srgbClr val="44546a"/>
+        <a:srgbClr val="1f497d"/>
       </a:dk2>
       <a:lt2>
-        <a:srgbClr val="e7e6e6"/>
+        <a:srgbClr val="eeece1"/>
       </a:lt2>
       <a:accent1>
-        <a:srgbClr val="4472c4"/>
+        <a:srgbClr val="4f81bd"/>
       </a:accent1>
       <a:accent2>
-        <a:srgbClr val="ed7d31"/>
+        <a:srgbClr val="c0504d"/>
       </a:accent2>
       <a:accent3>
-        <a:srgbClr val="a5a5a5"/>
+        <a:srgbClr val="9bbb59"/>
       </a:accent3>
       <a:accent4>
-        <a:srgbClr val="ffc000"/>
+        <a:srgbClr val="8064a2"/>
       </a:accent4>
       <a:accent5>
-        <a:srgbClr val="5b9bd5"/>
+        <a:srgbClr val="4bacc6"/>
       </a:accent5>
       <a:accent6>
-        <a:srgbClr val="70ad47"/>
+        <a:srgbClr val="f79646"/>
       </a:accent6>
       <a:hlink>
-        <a:srgbClr val="0563c1"/>
+        <a:srgbClr val="0000ff"/>
       </a:hlink>
       <a:folHlink>
-        <a:srgbClr val="954f72"/>
+        <a:srgbClr val="800080"/>
       </a:folHlink>
     </a:clrScheme>
     <a:fontScheme name="Office">
@@ -4460,18 +4136,21 @@
             </a:schemeClr>
           </a:solidFill>
           <a:prstDash val="solid"/>
+          <a:miter/>
         </a:ln>
         <a:ln w="25400" cap="flat" cmpd="sng" algn="ctr">
           <a:solidFill>
             <a:schemeClr val="phClr"/>
           </a:solidFill>
           <a:prstDash val="solid"/>
+          <a:miter/>
         </a:ln>
         <a:ln w="38100" cap="flat" cmpd="sng" algn="ctr">
           <a:solidFill>
             <a:schemeClr val="phClr"/>
           </a:solidFill>
           <a:prstDash val="solid"/>
+          <a:miter/>
         </a:ln>
       </a:lnStyleLst>
       <a:effectStyleLst>

</xml_diff>